<commit_message>
Updated Sprint1 evaluation scores
</commit_message>
<xml_diff>
--- a/9. HTML 5, CSS3 with Bootstrap 4, JavaScript ES6/2. CSS3/Slides/3. Layout/css3-m3-layout-slides.pptx
+++ b/9. HTML 5, CSS3 with Bootstrap 4, JavaScript ES6/2. CSS3/Slides/3. Layout/css3-m3-layout-slides.pptx
@@ -5,21 +5,21 @@
     <p:sldMasterId id="2147483648" r:id="rId1"/>
   </p:sldMasterIdLst>
   <p:notesMasterIdLst>
-    <p:notesMasterId r:id="rId14"/>
+    <p:notesMasterId r:id="rId15"/>
   </p:notesMasterIdLst>
   <p:sldIdLst>
-    <p:sldId id="256" r:id="rId2"/>
-    <p:sldId id="257" r:id="rId3"/>
-    <p:sldId id="258" r:id="rId4"/>
-    <p:sldId id="259" r:id="rId5"/>
-    <p:sldId id="260" r:id="rId6"/>
-    <p:sldId id="261" r:id="rId7"/>
-    <p:sldId id="262" r:id="rId8"/>
-    <p:sldId id="263" r:id="rId9"/>
-    <p:sldId id="264" r:id="rId10"/>
-    <p:sldId id="265" r:id="rId11"/>
-    <p:sldId id="266" r:id="rId12"/>
-    <p:sldId id="267" r:id="rId13"/>
+    <p:sldId id="256" r:id="rId3"/>
+    <p:sldId id="257" r:id="rId4"/>
+    <p:sldId id="258" r:id="rId5"/>
+    <p:sldId id="259" r:id="rId6"/>
+    <p:sldId id="260" r:id="rId7"/>
+    <p:sldId id="261" r:id="rId8"/>
+    <p:sldId id="262" r:id="rId9"/>
+    <p:sldId id="263" r:id="rId10"/>
+    <p:sldId id="264" r:id="rId11"/>
+    <p:sldId id="265" r:id="rId12"/>
+    <p:sldId id="266" r:id="rId13"/>
+    <p:sldId id="267" r:id="rId14"/>
   </p:sldIdLst>
   <p:sldSz cx="9144000" cy="6858000" type="screen4x3"/>
   <p:notesSz cx="9144000" cy="6858000"/>
@@ -203,7 +203,6 @@
           <a:p>
             <a:fld id="{70B21A1A-C7A7-4445-BBFB-BE9FB57805C7}" type="datetimeFigureOut">
               <a:rPr lang="en-US" smtClean="0"/>
-              <a:t>6/25/2021</a:t>
             </a:fld>
             <a:endParaRPr lang="en-US"/>
           </a:p>
@@ -272,6 +271,7 @@
               <a:rPr lang="en-US" smtClean="0"/>
               <a:t>Click to edit Master text styles</a:t>
             </a:r>
+            <a:endParaRPr lang="en-US" smtClean="0"/>
           </a:p>
           <a:p>
             <a:pPr lvl="1"/>
@@ -279,6 +279,7 @@
               <a:rPr lang="en-US" smtClean="0"/>
               <a:t>Second level</a:t>
             </a:r>
+            <a:endParaRPr lang="en-US" smtClean="0"/>
           </a:p>
           <a:p>
             <a:pPr lvl="2"/>
@@ -286,6 +287,7 @@
               <a:rPr lang="en-US" smtClean="0"/>
               <a:t>Third level</a:t>
             </a:r>
+            <a:endParaRPr lang="en-US" smtClean="0"/>
           </a:p>
           <a:p>
             <a:pPr lvl="3"/>
@@ -293,6 +295,7 @@
               <a:rPr lang="en-US" smtClean="0"/>
               <a:t>Fourth level</a:t>
             </a:r>
+            <a:endParaRPr lang="en-US" smtClean="0"/>
           </a:p>
           <a:p>
             <a:pPr lvl="4"/>
@@ -364,7 +367,6 @@
           <a:p>
             <a:fld id="{9998DDA1-938A-41A9-A138-909C1C62E213}" type="slidenum">
               <a:rPr lang="en-US" smtClean="0"/>
-              <a:t>‹#›</a:t>
             </a:fld>
             <a:endParaRPr lang="en-US"/>
           </a:p>
@@ -514,14 +516,12 @@
                 <a:solidFill>
                   <a:schemeClr val="tx1"/>
                 </a:solidFill>
-                <a:latin typeface="Arial"/>
-                <a:cs typeface="Arial"/>
+                <a:latin typeface="Arial" panose="020B0604020202020204"/>
+                <a:cs typeface="Arial" panose="020B0604020202020204"/>
               </a:defRPr>
             </a:lvl1pPr>
           </a:lstStyle>
-          <a:p>
-            <a:endParaRPr/>
-          </a:p>
+          <a:p/>
         </p:txBody>
       </p:sp>
       <p:sp>
@@ -552,9 +552,7 @@
               <a:defRPr/>
             </a:lvl1pPr>
           </a:lstStyle>
-          <a:p>
-            <a:endParaRPr/>
-          </a:p>
+          <a:p/>
         </p:txBody>
       </p:sp>
       <p:sp>
@@ -581,9 +579,7 @@
               </a:defRPr>
             </a:lvl1pPr>
           </a:lstStyle>
-          <a:p>
-            <a:endParaRPr/>
-          </a:p>
+          <a:p/>
         </p:txBody>
       </p:sp>
       <p:sp>
@@ -613,7 +609,6 @@
           <a:p>
             <a:fld id="{D921509B-6E26-456A-A10F-E485CE8E0243}" type="datetime1">
               <a:rPr lang="en-US" smtClean="0"/>
-              <a:t>6/25/2021</a:t>
             </a:fld>
             <a:endParaRPr lang="en-US"/>
           </a:p>
@@ -646,8 +641,6 @@
           <a:p>
             <a:fld id="{B6F15528-21DE-4FAA-801E-634DDDAF4B2B}" type="slidenum">
               <a:rPr/>
-              <a:pPr/>
-              <a:t>‹#›</a:t>
             </a:fld>
             <a:endParaRPr/>
           </a:p>
@@ -697,14 +690,12 @@
                 <a:solidFill>
                   <a:schemeClr val="tx1"/>
                 </a:solidFill>
-                <a:latin typeface="Arial"/>
-                <a:cs typeface="Arial"/>
+                <a:latin typeface="Arial" panose="020B0604020202020204"/>
+                <a:cs typeface="Arial" panose="020B0604020202020204"/>
               </a:defRPr>
             </a:lvl1pPr>
           </a:lstStyle>
-          <a:p>
-            <a:endParaRPr/>
-          </a:p>
+          <a:p/>
         </p:txBody>
       </p:sp>
       <p:sp>
@@ -729,9 +720,7 @@
               </a:defRPr>
             </a:lvl1pPr>
           </a:lstStyle>
-          <a:p>
-            <a:endParaRPr/>
-          </a:p>
+          <a:p/>
         </p:txBody>
       </p:sp>
       <p:sp>
@@ -758,9 +747,7 @@
               </a:defRPr>
             </a:lvl1pPr>
           </a:lstStyle>
-          <a:p>
-            <a:endParaRPr/>
-          </a:p>
+          <a:p/>
         </p:txBody>
       </p:sp>
       <p:sp>
@@ -790,7 +777,6 @@
           <a:p>
             <a:fld id="{65CD130B-D258-4449-B2D6-D36629352718}" type="datetime1">
               <a:rPr lang="en-US" smtClean="0"/>
-              <a:t>6/25/2021</a:t>
             </a:fld>
             <a:endParaRPr lang="en-US"/>
           </a:p>
@@ -823,8 +809,6 @@
           <a:p>
             <a:fld id="{B6F15528-21DE-4FAA-801E-634DDDAF4B2B}" type="slidenum">
               <a:rPr/>
-              <a:pPr/>
-              <a:t>‹#›</a:t>
             </a:fld>
             <a:endParaRPr/>
           </a:p>
@@ -874,14 +858,12 @@
                 <a:solidFill>
                   <a:schemeClr val="tx1"/>
                 </a:solidFill>
-                <a:latin typeface="Arial"/>
-                <a:cs typeface="Arial"/>
+                <a:latin typeface="Arial" panose="020B0604020202020204"/>
+                <a:cs typeface="Arial" panose="020B0604020202020204"/>
               </a:defRPr>
             </a:lvl1pPr>
           </a:lstStyle>
-          <a:p>
-            <a:endParaRPr/>
-          </a:p>
+          <a:p/>
         </p:txBody>
       </p:sp>
       <p:sp>
@@ -913,14 +895,12 @@
                 <a:solidFill>
                   <a:schemeClr val="tx1"/>
                 </a:solidFill>
-                <a:latin typeface="Consolas"/>
-                <a:cs typeface="Consolas"/>
+                <a:latin typeface="Consolas" panose="020B0609020204030204"/>
+                <a:cs typeface="Consolas" panose="020B0609020204030204"/>
               </a:defRPr>
             </a:lvl1pPr>
           </a:lstStyle>
-          <a:p>
-            <a:endParaRPr/>
-          </a:p>
+          <a:p/>
         </p:txBody>
       </p:sp>
       <p:sp>
@@ -951,9 +931,7 @@
               <a:defRPr/>
             </a:lvl1pPr>
           </a:lstStyle>
-          <a:p>
-            <a:endParaRPr/>
-          </a:p>
+          <a:p/>
         </p:txBody>
       </p:sp>
       <p:sp>
@@ -980,9 +958,7 @@
               </a:defRPr>
             </a:lvl1pPr>
           </a:lstStyle>
-          <a:p>
-            <a:endParaRPr/>
-          </a:p>
+          <a:p/>
         </p:txBody>
       </p:sp>
       <p:sp>
@@ -1012,7 +988,6 @@
           <a:p>
             <a:fld id="{FB77C9E1-563B-4E79-860E-E8A2691E0DF3}" type="datetime1">
               <a:rPr lang="en-US" smtClean="0"/>
-              <a:t>6/25/2021</a:t>
             </a:fld>
             <a:endParaRPr lang="en-US"/>
           </a:p>
@@ -1045,8 +1020,6 @@
           <a:p>
             <a:fld id="{B6F15528-21DE-4FAA-801E-634DDDAF4B2B}" type="slidenum">
               <a:rPr/>
-              <a:pPr/>
-              <a:t>‹#›</a:t>
             </a:fld>
             <a:endParaRPr/>
           </a:p>
@@ -1096,14 +1069,12 @@
                 <a:solidFill>
                   <a:schemeClr val="tx1"/>
                 </a:solidFill>
-                <a:latin typeface="Arial"/>
-                <a:cs typeface="Arial"/>
+                <a:latin typeface="Arial" panose="020B0604020202020204"/>
+                <a:cs typeface="Arial" panose="020B0604020202020204"/>
               </a:defRPr>
             </a:lvl1pPr>
           </a:lstStyle>
-          <a:p>
-            <a:endParaRPr/>
-          </a:p>
+          <a:p/>
         </p:txBody>
       </p:sp>
       <p:sp>
@@ -1130,9 +1101,7 @@
               </a:defRPr>
             </a:lvl1pPr>
           </a:lstStyle>
-          <a:p>
-            <a:endParaRPr/>
-          </a:p>
+          <a:p/>
         </p:txBody>
       </p:sp>
       <p:sp>
@@ -1162,7 +1131,6 @@
           <a:p>
             <a:fld id="{D4C9AB43-BEBC-4ADB-B8D7-4AFC8DF231F4}" type="datetime1">
               <a:rPr lang="en-US" smtClean="0"/>
-              <a:t>6/25/2021</a:t>
             </a:fld>
             <a:endParaRPr lang="en-US"/>
           </a:p>
@@ -1195,8 +1163,6 @@
           <a:p>
             <a:fld id="{B6F15528-21DE-4FAA-801E-634DDDAF4B2B}" type="slidenum">
               <a:rPr/>
-              <a:pPr/>
-              <a:t>‹#›</a:t>
             </a:fld>
             <a:endParaRPr/>
           </a:p>
@@ -1251,9 +1217,7 @@
               </a:defRPr>
             </a:lvl1pPr>
           </a:lstStyle>
-          <a:p>
-            <a:endParaRPr/>
-          </a:p>
+          <a:p/>
         </p:txBody>
       </p:sp>
       <p:sp>
@@ -1283,7 +1247,6 @@
           <a:p>
             <a:fld id="{649D1CFA-0DCE-4A05-BBA9-27696DB9DA87}" type="datetime1">
               <a:rPr lang="en-US" smtClean="0"/>
-              <a:t>6/25/2021</a:t>
             </a:fld>
             <a:endParaRPr lang="en-US"/>
           </a:p>
@@ -1316,8 +1279,6 @@
           <a:p>
             <a:fld id="{B6F15528-21DE-4FAA-801E-634DDDAF4B2B}" type="slidenum">
               <a:rPr/>
-              <a:pPr/>
-              <a:t>‹#›</a:t>
             </a:fld>
             <a:endParaRPr/>
           </a:p>
@@ -1385,14 +1346,12 @@
                 <a:solidFill>
                   <a:schemeClr val="tx1"/>
                 </a:solidFill>
-                <a:latin typeface="Arial"/>
-                <a:cs typeface="Arial"/>
+                <a:latin typeface="Arial" panose="020B0604020202020204"/>
+                <a:cs typeface="Arial" panose="020B0604020202020204"/>
               </a:defRPr>
             </a:lvl1pPr>
           </a:lstStyle>
-          <a:p>
-            <a:endParaRPr/>
-          </a:p>
+          <a:p/>
         </p:txBody>
       </p:sp>
       <p:sp>
@@ -1427,9 +1386,7 @@
               </a:defRPr>
             </a:lvl1pPr>
           </a:lstStyle>
-          <a:p>
-            <a:endParaRPr/>
-          </a:p>
+          <a:p/>
         </p:txBody>
       </p:sp>
       <p:sp>
@@ -1466,9 +1423,7 @@
               </a:defRPr>
             </a:lvl1pPr>
           </a:lstStyle>
-          <a:p>
-            <a:endParaRPr/>
-          </a:p>
+          <a:p/>
         </p:txBody>
       </p:sp>
       <p:sp>
@@ -1508,7 +1463,6 @@
           <a:p>
             <a:fld id="{5FFB8BD3-1B18-412D-BB18-0B5087509A3C}" type="datetime1">
               <a:rPr lang="en-US" smtClean="0"/>
-              <a:t>6/25/2021</a:t>
             </a:fld>
             <a:endParaRPr lang="en-US"/>
           </a:p>
@@ -1551,8 +1505,6 @@
           <a:p>
             <a:fld id="{B6F15528-21DE-4FAA-801E-634DDDAF4B2B}" type="slidenum">
               <a:rPr/>
-              <a:pPr/>
-              <a:t>‹#›</a:t>
             </a:fld>
             <a:endParaRPr/>
           </a:p>
@@ -1562,11 +1514,11 @@
   </p:cSld>
   <p:clrMap bg1="lt1" tx1="dk1" bg2="lt2" tx2="dk2" accent1="accent1" accent2="accent2" accent3="accent3" accent4="accent4" accent5="accent5" accent6="accent6" hlink="hlink" folHlink="folHlink"/>
   <p:sldLayoutIdLst>
-    <p:sldLayoutId id="2147483661" r:id="rId1"/>
-    <p:sldLayoutId id="2147483662" r:id="rId2"/>
-    <p:sldLayoutId id="2147483663" r:id="rId3"/>
-    <p:sldLayoutId id="2147483664" r:id="rId4"/>
-    <p:sldLayoutId id="2147483665" r:id="rId5"/>
+    <p:sldLayoutId id="2147483649" r:id="rId1"/>
+    <p:sldLayoutId id="2147483650" r:id="rId2"/>
+    <p:sldLayoutId id="2147483651" r:id="rId3"/>
+    <p:sldLayoutId id="2147483652" r:id="rId4"/>
+    <p:sldLayoutId id="2147483653" r:id="rId5"/>
   </p:sldLayoutIdLst>
   <p:hf hdr="0" ftr="0" dt="0"/>
   <p:txStyles>
@@ -1761,14 +1713,14 @@
             </a:pPr>
             <a:r>
               <a:rPr sz="3200" b="1" dirty="0">
-                <a:latin typeface="Arial"/>
-                <a:cs typeface="Arial"/>
+                <a:latin typeface="Arial" panose="020B0604020202020204"/>
+                <a:cs typeface="Arial" panose="020B0604020202020204"/>
               </a:rPr>
               <a:t>CSS3:</a:t>
             </a:r>
             <a:endParaRPr sz="3200">
-              <a:latin typeface="Arial"/>
-              <a:cs typeface="Arial"/>
+              <a:latin typeface="Arial" panose="020B0604020202020204"/>
+              <a:cs typeface="Arial" panose="020B0604020202020204"/>
             </a:endParaRPr>
           </a:p>
           <a:p>
@@ -1779,35 +1731,35 @@
             </a:pPr>
             <a:r>
               <a:rPr sz="3200" b="1" spc="-5" dirty="0">
-                <a:latin typeface="Arial"/>
-                <a:cs typeface="Arial"/>
+                <a:latin typeface="Arial" panose="020B0604020202020204"/>
+                <a:cs typeface="Arial" panose="020B0604020202020204"/>
               </a:rPr>
               <a:t>L</a:t>
             </a:r>
             <a:r>
               <a:rPr sz="3200" b="1" dirty="0">
-                <a:latin typeface="Arial"/>
-                <a:cs typeface="Arial"/>
+                <a:latin typeface="Arial" panose="020B0604020202020204"/>
+                <a:cs typeface="Arial" panose="020B0604020202020204"/>
               </a:rPr>
               <a:t>ay</a:t>
             </a:r>
             <a:r>
               <a:rPr sz="3200" b="1" spc="-5" dirty="0">
-                <a:latin typeface="Arial"/>
-                <a:cs typeface="Arial"/>
+                <a:latin typeface="Arial" panose="020B0604020202020204"/>
+                <a:cs typeface="Arial" panose="020B0604020202020204"/>
               </a:rPr>
               <a:t>ou</a:t>
             </a:r>
             <a:r>
               <a:rPr sz="3200" b="1" dirty="0">
-                <a:latin typeface="Arial"/>
-                <a:cs typeface="Arial"/>
+                <a:latin typeface="Arial" panose="020B0604020202020204"/>
+                <a:cs typeface="Arial" panose="020B0604020202020204"/>
               </a:rPr>
               <a:t>t</a:t>
             </a:r>
             <a:endParaRPr sz="3200">
-              <a:latin typeface="Arial"/>
-              <a:cs typeface="Arial"/>
+              <a:latin typeface="Arial" panose="020B0604020202020204"/>
+              <a:cs typeface="Arial" panose="020B0604020202020204"/>
             </a:endParaRPr>
           </a:p>
         </p:txBody>
@@ -1821,7 +1773,7 @@
           <p:nvPr/>
         </p:nvPicPr>
         <p:blipFill>
-          <a:blip r:embed="rId2"/>
+          <a:blip r:embed="rId1"/>
           <a:srcRect/>
           <a:stretch>
             <a:fillRect/>
@@ -1862,8 +1814,6 @@
           <a:p>
             <a:fld id="{B6F15528-21DE-4FAA-801E-634DDDAF4B2B}" type="slidenum">
               <a:rPr lang="en-US" smtClean="0"/>
-              <a:pPr/>
-              <a:t>1</a:t>
             </a:fld>
             <a:endParaRPr lang="en-US"/>
           </a:p>
@@ -1953,9 +1903,7 @@
           <p:txBody>
             <a:bodyPr wrap="square" lIns="0" tIns="0" rIns="0" bIns="0" rtlCol="0"/>
             <a:lstStyle/>
-            <a:p>
-              <a:endParaRPr/>
-            </a:p>
+            <a:p/>
           </p:txBody>
         </p:sp>
         <p:sp>
@@ -2005,9 +1953,7 @@
           <p:txBody>
             <a:bodyPr wrap="square" lIns="0" tIns="0" rIns="0" bIns="0" rtlCol="0"/>
             <a:lstStyle/>
-            <a:p>
-              <a:endParaRPr/>
-            </a:p>
+            <a:p/>
           </p:txBody>
         </p:sp>
       </p:grpSp>
@@ -2042,28 +1988,28 @@
             </a:pPr>
             <a:r>
               <a:rPr sz="1800" dirty="0">
-                <a:latin typeface="Consolas"/>
-                <a:cs typeface="Consolas"/>
+                <a:latin typeface="Consolas" panose="020B0609020204030204"/>
+                <a:cs typeface="Consolas" panose="020B0609020204030204"/>
               </a:rPr>
               <a:t>div</a:t>
             </a:r>
             <a:r>
               <a:rPr sz="1800" spc="-65" dirty="0">
-                <a:latin typeface="Consolas"/>
-                <a:cs typeface="Consolas"/>
+                <a:latin typeface="Consolas" panose="020B0609020204030204"/>
+                <a:cs typeface="Consolas" panose="020B0609020204030204"/>
               </a:rPr>
               <a:t> </a:t>
             </a:r>
             <a:r>
               <a:rPr sz="1800" dirty="0">
-                <a:latin typeface="Consolas"/>
-                <a:cs typeface="Consolas"/>
+                <a:latin typeface="Consolas" panose="020B0609020204030204"/>
+                <a:cs typeface="Consolas" panose="020B0609020204030204"/>
               </a:rPr>
               <a:t>{</a:t>
             </a:r>
             <a:endParaRPr sz="1800">
-              <a:latin typeface="Consolas"/>
-              <a:cs typeface="Consolas"/>
+              <a:latin typeface="Consolas" panose="020B0609020204030204"/>
+              <a:cs typeface="Consolas" panose="020B0609020204030204"/>
             </a:endParaRPr>
           </a:p>
           <a:p>
@@ -2077,14 +2023,14 @@
             </a:pPr>
             <a:r>
               <a:rPr sz="1800" dirty="0">
-                <a:latin typeface="Consolas"/>
-                <a:cs typeface="Consolas"/>
+                <a:latin typeface="Consolas" panose="020B0609020204030204"/>
+                <a:cs typeface="Consolas" panose="020B0609020204030204"/>
               </a:rPr>
               <a:t>background:</a:t>
             </a:r>
             <a:endParaRPr sz="1800">
-              <a:latin typeface="Consolas"/>
-              <a:cs typeface="Consolas"/>
+              <a:latin typeface="Consolas" panose="020B0609020204030204"/>
+              <a:cs typeface="Consolas" panose="020B0609020204030204"/>
             </a:endParaRPr>
           </a:p>
         </p:txBody>
@@ -2125,14 +2071,14 @@
                       </a:pPr>
                       <a:r>
                         <a:rPr sz="1800" dirty="0">
-                          <a:latin typeface="Consolas"/>
-                          <a:cs typeface="Consolas"/>
+                          <a:latin typeface="Consolas" panose="020B0609020204030204"/>
+                          <a:cs typeface="Consolas" panose="020B0609020204030204"/>
                         </a:rPr>
                         <a:t>url(img01.png),</a:t>
                       </a:r>
                       <a:endParaRPr sz="1800">
-                        <a:latin typeface="Consolas"/>
-                        <a:cs typeface="Consolas"/>
+                        <a:latin typeface="Consolas" panose="020B0609020204030204"/>
+                        <a:cs typeface="Consolas" panose="020B0609020204030204"/>
                       </a:endParaRPr>
                     </a:p>
                   </a:txBody>
@@ -2154,14 +2100,14 @@
                       </a:pPr>
                       <a:r>
                         <a:rPr sz="1800" dirty="0">
-                          <a:latin typeface="Consolas"/>
-                          <a:cs typeface="Consolas"/>
+                          <a:latin typeface="Consolas" panose="020B0609020204030204"/>
+                          <a:cs typeface="Consolas" panose="020B0609020204030204"/>
                         </a:rPr>
                         <a:t>/*</a:t>
                       </a:r>
                       <a:endParaRPr sz="1800">
-                        <a:latin typeface="Consolas"/>
-                        <a:cs typeface="Consolas"/>
+                        <a:latin typeface="Consolas" panose="020B0609020204030204"/>
+                        <a:cs typeface="Consolas" panose="020B0609020204030204"/>
                       </a:endParaRPr>
                     </a:p>
                   </a:txBody>
@@ -2176,21 +2122,21 @@
                     <a:bodyPr/>
                     <a:lstStyle/>
                     <a:p>
-                      <a:pPr marL="61594">
+                      <a:pPr marL="61595">
                         <a:lnSpc>
                           <a:spcPts val="1695"/>
                         </a:lnSpc>
                       </a:pPr>
                       <a:r>
                         <a:rPr sz="1800" dirty="0">
-                          <a:latin typeface="Consolas"/>
-                          <a:cs typeface="Consolas"/>
+                          <a:latin typeface="Consolas" panose="020B0609020204030204"/>
+                          <a:cs typeface="Consolas" panose="020B0609020204030204"/>
                         </a:rPr>
                         <a:t>above*/</a:t>
                       </a:r>
                       <a:endParaRPr sz="1800">
-                        <a:latin typeface="Consolas"/>
-                        <a:cs typeface="Consolas"/>
+                        <a:latin typeface="Consolas" panose="020B0609020204030204"/>
+                        <a:cs typeface="Consolas" panose="020B0609020204030204"/>
                       </a:endParaRPr>
                     </a:p>
                   </a:txBody>
@@ -2214,14 +2160,14 @@
                       </a:pPr>
                       <a:r>
                         <a:rPr sz="1800" dirty="0">
-                          <a:latin typeface="Consolas"/>
-                          <a:cs typeface="Consolas"/>
+                          <a:latin typeface="Consolas" panose="020B0609020204030204"/>
+                          <a:cs typeface="Consolas" panose="020B0609020204030204"/>
                         </a:rPr>
                         <a:t>url(img02.png),</a:t>
                       </a:r>
                       <a:endParaRPr sz="1800">
-                        <a:latin typeface="Consolas"/>
-                        <a:cs typeface="Consolas"/>
+                        <a:latin typeface="Consolas" panose="020B0609020204030204"/>
+                        <a:cs typeface="Consolas" panose="020B0609020204030204"/>
                       </a:endParaRPr>
                     </a:p>
                   </a:txBody>
@@ -2243,14 +2189,14 @@
                       </a:pPr>
                       <a:r>
                         <a:rPr sz="1800" dirty="0">
-                          <a:latin typeface="Consolas"/>
-                          <a:cs typeface="Consolas"/>
+                          <a:latin typeface="Consolas" panose="020B0609020204030204"/>
+                          <a:cs typeface="Consolas" panose="020B0609020204030204"/>
                         </a:rPr>
                         <a:t>/*</a:t>
                       </a:r>
                       <a:endParaRPr sz="1800">
-                        <a:latin typeface="Consolas"/>
-                        <a:cs typeface="Consolas"/>
+                        <a:latin typeface="Consolas" panose="020B0609020204030204"/>
+                        <a:cs typeface="Consolas" panose="020B0609020204030204"/>
                       </a:endParaRPr>
                     </a:p>
                   </a:txBody>
@@ -2265,35 +2211,35 @@
                     <a:bodyPr/>
                     <a:lstStyle/>
                     <a:p>
-                      <a:pPr marL="61594">
+                      <a:pPr marL="61595">
                         <a:lnSpc>
                           <a:spcPts val="2095"/>
                         </a:lnSpc>
                       </a:pPr>
                       <a:r>
                         <a:rPr sz="1800" dirty="0">
-                          <a:latin typeface="Consolas"/>
-                          <a:cs typeface="Consolas"/>
+                          <a:latin typeface="Consolas" panose="020B0609020204030204"/>
+                          <a:cs typeface="Consolas" panose="020B0609020204030204"/>
                         </a:rPr>
                         <a:t>middle</a:t>
                       </a:r>
                       <a:r>
                         <a:rPr sz="1800" spc="-80" dirty="0">
-                          <a:latin typeface="Consolas"/>
-                          <a:cs typeface="Consolas"/>
+                          <a:latin typeface="Consolas" panose="020B0609020204030204"/>
+                          <a:cs typeface="Consolas" panose="020B0609020204030204"/>
                         </a:rPr>
                         <a:t> </a:t>
                       </a:r>
                       <a:r>
                         <a:rPr sz="1800" dirty="0">
-                          <a:latin typeface="Consolas"/>
-                          <a:cs typeface="Consolas"/>
+                          <a:latin typeface="Consolas" panose="020B0609020204030204"/>
+                          <a:cs typeface="Consolas" panose="020B0609020204030204"/>
                         </a:rPr>
                         <a:t>*/</a:t>
                       </a:r>
                       <a:endParaRPr sz="1800">
-                        <a:latin typeface="Consolas"/>
-                        <a:cs typeface="Consolas"/>
+                        <a:latin typeface="Consolas" panose="020B0609020204030204"/>
+                        <a:cs typeface="Consolas" panose="020B0609020204030204"/>
                       </a:endParaRPr>
                     </a:p>
                   </a:txBody>
@@ -2310,21 +2256,21 @@
                     <a:bodyPr/>
                     <a:lstStyle/>
                     <a:p>
-                      <a:pPr marL="32384">
+                      <a:pPr marL="32385">
                         <a:lnSpc>
                           <a:spcPts val="2095"/>
                         </a:lnSpc>
                       </a:pPr>
                       <a:r>
                         <a:rPr sz="1800" dirty="0">
-                          <a:latin typeface="Consolas"/>
-                          <a:cs typeface="Consolas"/>
+                          <a:latin typeface="Consolas" panose="020B0609020204030204"/>
+                          <a:cs typeface="Consolas" panose="020B0609020204030204"/>
                         </a:rPr>
                         <a:t>url(img03.png),</a:t>
                       </a:r>
                       <a:endParaRPr sz="1800">
-                        <a:latin typeface="Consolas"/>
-                        <a:cs typeface="Consolas"/>
+                        <a:latin typeface="Consolas" panose="020B0609020204030204"/>
+                        <a:cs typeface="Consolas" panose="020B0609020204030204"/>
                       </a:endParaRPr>
                     </a:p>
                   </a:txBody>
@@ -2346,14 +2292,14 @@
                       </a:pPr>
                       <a:r>
                         <a:rPr sz="1800" dirty="0">
-                          <a:latin typeface="Consolas"/>
-                          <a:cs typeface="Consolas"/>
+                          <a:latin typeface="Consolas" panose="020B0609020204030204"/>
+                          <a:cs typeface="Consolas" panose="020B0609020204030204"/>
                         </a:rPr>
                         <a:t>/*</a:t>
                       </a:r>
                       <a:endParaRPr sz="1800">
-                        <a:latin typeface="Consolas"/>
-                        <a:cs typeface="Consolas"/>
+                        <a:latin typeface="Consolas" panose="020B0609020204030204"/>
+                        <a:cs typeface="Consolas" panose="020B0609020204030204"/>
                       </a:endParaRPr>
                     </a:p>
                   </a:txBody>
@@ -2375,28 +2321,28 @@
                       </a:pPr>
                       <a:r>
                         <a:rPr sz="1800" dirty="0">
-                          <a:latin typeface="Consolas"/>
-                          <a:cs typeface="Consolas"/>
+                          <a:latin typeface="Consolas" panose="020B0609020204030204"/>
+                          <a:cs typeface="Consolas" panose="020B0609020204030204"/>
                         </a:rPr>
                         <a:t>below</a:t>
                       </a:r>
                       <a:r>
                         <a:rPr sz="1800" spc="-65" dirty="0">
-                          <a:latin typeface="Consolas"/>
-                          <a:cs typeface="Consolas"/>
+                          <a:latin typeface="Consolas" panose="020B0609020204030204"/>
+                          <a:cs typeface="Consolas" panose="020B0609020204030204"/>
                         </a:rPr>
                         <a:t> </a:t>
                       </a:r>
                       <a:r>
                         <a:rPr sz="1800" dirty="0">
-                          <a:latin typeface="Consolas"/>
-                          <a:cs typeface="Consolas"/>
+                          <a:latin typeface="Consolas" panose="020B0609020204030204"/>
+                          <a:cs typeface="Consolas" panose="020B0609020204030204"/>
                         </a:rPr>
                         <a:t>*/</a:t>
                       </a:r>
                       <a:endParaRPr sz="1800">
-                        <a:latin typeface="Consolas"/>
-                        <a:cs typeface="Consolas"/>
+                        <a:latin typeface="Consolas" panose="020B0609020204030204"/>
+                        <a:cs typeface="Consolas" panose="020B0609020204030204"/>
                       </a:endParaRPr>
                     </a:p>
                   </a:txBody>
@@ -2442,70 +2388,70 @@
             </a:pPr>
             <a:r>
               <a:rPr sz="1800" dirty="0">
-                <a:latin typeface="Consolas"/>
-                <a:cs typeface="Consolas"/>
+                <a:latin typeface="Consolas" panose="020B0609020204030204"/>
+                <a:cs typeface="Consolas" panose="020B0609020204030204"/>
               </a:rPr>
               <a:t>#555555;</a:t>
             </a:r>
             <a:r>
               <a:rPr sz="1800" spc="-25" dirty="0">
-                <a:latin typeface="Consolas"/>
-                <a:cs typeface="Consolas"/>
+                <a:latin typeface="Consolas" panose="020B0609020204030204"/>
+                <a:cs typeface="Consolas" panose="020B0609020204030204"/>
               </a:rPr>
               <a:t> </a:t>
             </a:r>
             <a:r>
               <a:rPr sz="1800" dirty="0">
-                <a:latin typeface="Consolas"/>
-                <a:cs typeface="Consolas"/>
+                <a:latin typeface="Consolas" panose="020B0609020204030204"/>
+                <a:cs typeface="Consolas" panose="020B0609020204030204"/>
               </a:rPr>
               <a:t>/*</a:t>
             </a:r>
             <a:r>
               <a:rPr sz="1800" spc="-25" dirty="0">
-                <a:latin typeface="Consolas"/>
-                <a:cs typeface="Consolas"/>
+                <a:latin typeface="Consolas" panose="020B0609020204030204"/>
+                <a:cs typeface="Consolas" panose="020B0609020204030204"/>
               </a:rPr>
               <a:t> </a:t>
             </a:r>
             <a:r>
               <a:rPr sz="1800" dirty="0">
-                <a:latin typeface="Consolas"/>
-                <a:cs typeface="Consolas"/>
+                <a:latin typeface="Consolas" panose="020B0609020204030204"/>
+                <a:cs typeface="Consolas" panose="020B0609020204030204"/>
               </a:rPr>
               <a:t>under</a:t>
             </a:r>
             <a:r>
               <a:rPr sz="1800" spc="-25" dirty="0">
-                <a:latin typeface="Consolas"/>
-                <a:cs typeface="Consolas"/>
+                <a:latin typeface="Consolas" panose="020B0609020204030204"/>
+                <a:cs typeface="Consolas" panose="020B0609020204030204"/>
               </a:rPr>
               <a:t> </a:t>
             </a:r>
             <a:r>
               <a:rPr sz="1800" dirty="0">
-                <a:latin typeface="Consolas"/>
-                <a:cs typeface="Consolas"/>
+                <a:latin typeface="Consolas" panose="020B0609020204030204"/>
+                <a:cs typeface="Consolas" panose="020B0609020204030204"/>
               </a:rPr>
               <a:t>all</a:t>
             </a:r>
             <a:r>
               <a:rPr sz="1800" spc="-25" dirty="0">
-                <a:latin typeface="Consolas"/>
-                <a:cs typeface="Consolas"/>
+                <a:latin typeface="Consolas" panose="020B0609020204030204"/>
+                <a:cs typeface="Consolas" panose="020B0609020204030204"/>
               </a:rPr>
               <a:t> </a:t>
             </a:r>
             <a:r>
               <a:rPr sz="1800" dirty="0">
-                <a:latin typeface="Consolas"/>
-                <a:cs typeface="Consolas"/>
+                <a:latin typeface="Consolas" panose="020B0609020204030204"/>
+                <a:cs typeface="Consolas" panose="020B0609020204030204"/>
               </a:rPr>
               <a:t>images</a:t>
             </a:r>
             <a:endParaRPr sz="1800">
-              <a:latin typeface="Consolas"/>
-              <a:cs typeface="Consolas"/>
+              <a:latin typeface="Consolas" panose="020B0609020204030204"/>
+              <a:cs typeface="Consolas" panose="020B0609020204030204"/>
             </a:endParaRPr>
           </a:p>
         </p:txBody>
@@ -2531,7 +2477,7 @@
             <p:nvPr/>
           </p:nvPicPr>
           <p:blipFill>
-            <a:blip r:embed="rId2" cstate="print"/>
+            <a:blip r:embed="rId1" cstate="print"/>
             <a:stretch>
               <a:fillRect/>
             </a:stretch>
@@ -2591,9 +2537,7 @@
           <p:txBody>
             <a:bodyPr wrap="square" lIns="0" tIns="0" rIns="0" bIns="0" rtlCol="0"/>
             <a:lstStyle/>
-            <a:p>
-              <a:endParaRPr/>
-            </a:p>
+            <a:p/>
           </p:txBody>
         </p:sp>
         <p:sp>
@@ -2643,9 +2587,7 @@
           <p:txBody>
             <a:bodyPr wrap="square" lIns="0" tIns="0" rIns="0" bIns="0" rtlCol="0"/>
             <a:lstStyle/>
-            <a:p>
-              <a:endParaRPr/>
-            </a:p>
+            <a:p/>
           </p:txBody>
         </p:sp>
         <p:pic>
@@ -2655,7 +2597,7 @@
             <p:nvPr/>
           </p:nvPicPr>
           <p:blipFill>
-            <a:blip r:embed="rId3" cstate="print"/>
+            <a:blip r:embed="rId2" cstate="print"/>
             <a:stretch>
               <a:fillRect/>
             </a:stretch>
@@ -3267,9 +3209,7 @@
           <p:txBody>
             <a:bodyPr wrap="square" lIns="0" tIns="0" rIns="0" bIns="0" rtlCol="0"/>
             <a:lstStyle/>
-            <a:p>
-              <a:endParaRPr/>
-            </a:p>
+            <a:p/>
           </p:txBody>
         </p:sp>
         <p:sp>
@@ -3871,9 +3811,7 @@
           <p:txBody>
             <a:bodyPr wrap="square" lIns="0" tIns="0" rIns="0" bIns="0" rtlCol="0"/>
             <a:lstStyle/>
-            <a:p>
-              <a:endParaRPr/>
-            </a:p>
+            <a:p/>
           </p:txBody>
         </p:sp>
       </p:grpSp>
@@ -3922,6 +3860,7 @@
               <a:rPr spc="-5" dirty="0"/>
               <a:t>Background</a:t>
             </a:r>
+            <a:endParaRPr spc="-5" dirty="0"/>
           </a:p>
         </p:txBody>
       </p:sp>
@@ -3989,7 +3928,7 @@
             <p:nvPr/>
           </p:nvPicPr>
           <p:blipFill>
-            <a:blip r:embed="rId4" cstate="print"/>
+            <a:blip r:embed="rId3" cstate="print"/>
             <a:stretch>
               <a:fillRect/>
             </a:stretch>
@@ -4409,9 +4348,7 @@
           <p:txBody>
             <a:bodyPr wrap="square" lIns="0" tIns="0" rIns="0" bIns="0" rtlCol="0"/>
             <a:lstStyle/>
-            <a:p>
-              <a:endParaRPr/>
-            </a:p>
+            <a:p/>
           </p:txBody>
         </p:sp>
         <p:sp>
@@ -4821,9 +4758,7 @@
           <p:txBody>
             <a:bodyPr wrap="square" lIns="0" tIns="0" rIns="0" bIns="0" rtlCol="0"/>
             <a:lstStyle/>
-            <a:p>
-              <a:endParaRPr/>
-            </a:p>
+            <a:p/>
           </p:txBody>
         </p:sp>
       </p:grpSp>
@@ -4891,7 +4826,7 @@
             <p:nvPr/>
           </p:nvPicPr>
           <p:blipFill>
-            <a:blip r:embed="rId5" cstate="print"/>
+            <a:blip r:embed="rId4" cstate="print"/>
             <a:stretch>
               <a:fillRect/>
             </a:stretch>
@@ -4913,7 +4848,7 @@
             <p:nvPr/>
           </p:nvPicPr>
           <p:blipFill>
-            <a:blip r:embed="rId6" cstate="print"/>
+            <a:blip r:embed="rId5" cstate="print"/>
             <a:stretch>
               <a:fillRect/>
             </a:stretch>
@@ -4935,7 +4870,7 @@
             <p:nvPr/>
           </p:nvPicPr>
           <p:blipFill>
-            <a:blip r:embed="rId7" cstate="print"/>
+            <a:blip r:embed="rId6" cstate="print"/>
             <a:stretch>
               <a:fillRect/>
             </a:stretch>
@@ -5165,9 +5100,7 @@
           <p:txBody>
             <a:bodyPr wrap="square" lIns="0" tIns="0" rIns="0" bIns="0" rtlCol="0"/>
             <a:lstStyle/>
-            <a:p>
-              <a:endParaRPr/>
-            </a:p>
+            <a:p/>
           </p:txBody>
         </p:sp>
       </p:grpSp>
@@ -5202,14 +5135,14 @@
             </a:pPr>
             <a:r>
               <a:rPr sz="1800" dirty="0">
-                <a:latin typeface="Consolas"/>
-                <a:cs typeface="Consolas"/>
+                <a:latin typeface="Consolas" panose="020B0609020204030204"/>
+                <a:cs typeface="Consolas" panose="020B0609020204030204"/>
               </a:rPr>
               <a:t>*/</a:t>
             </a:r>
             <a:endParaRPr sz="1800">
-              <a:latin typeface="Consolas"/>
-              <a:cs typeface="Consolas"/>
+              <a:latin typeface="Consolas" panose="020B0609020204030204"/>
+              <a:cs typeface="Consolas" panose="020B0609020204030204"/>
             </a:endParaRPr>
           </a:p>
           <a:p>
@@ -5223,14 +5156,14 @@
             </a:pPr>
             <a:r>
               <a:rPr sz="1800" dirty="0">
-                <a:latin typeface="Consolas"/>
-                <a:cs typeface="Consolas"/>
+                <a:latin typeface="Consolas" panose="020B0609020204030204"/>
+                <a:cs typeface="Consolas" panose="020B0609020204030204"/>
               </a:rPr>
               <a:t>}</a:t>
             </a:r>
             <a:endParaRPr sz="1800">
-              <a:latin typeface="Consolas"/>
-              <a:cs typeface="Consolas"/>
+              <a:latin typeface="Consolas" panose="020B0609020204030204"/>
+              <a:cs typeface="Consolas" panose="020B0609020204030204"/>
             </a:endParaRPr>
           </a:p>
           <a:p>
@@ -5270,8 +5203,6 @@
           <a:p>
             <a:fld id="{B6F15528-21DE-4FAA-801E-634DDDAF4B2B}" type="slidenum">
               <a:rPr lang="en-US" smtClean="0"/>
-              <a:pPr/>
-              <a:t>10</a:t>
             </a:fld>
             <a:endParaRPr lang="en-US"/>
           </a:p>
@@ -5359,6 +5290,7 @@
               <a:rPr spc="-5" dirty="0"/>
               <a:t>Site</a:t>
             </a:r>
+            <a:endParaRPr spc="-5" dirty="0"/>
           </a:p>
         </p:txBody>
       </p:sp>
@@ -5515,9 +5447,7 @@
         <p:txBody>
           <a:bodyPr wrap="square" lIns="0" tIns="0" rIns="0" bIns="0" rtlCol="0"/>
           <a:lstStyle/>
-          <a:p>
-            <a:endParaRPr/>
-          </a:p>
+          <a:p/>
         </p:txBody>
       </p:sp>
       <p:sp>
@@ -5554,14 +5484,14 @@
                 <a:solidFill>
                   <a:srgbClr val="FFFFFF"/>
                 </a:solidFill>
-                <a:latin typeface="Arial"/>
-                <a:cs typeface="Arial"/>
+                <a:latin typeface="Arial" panose="020B0604020202020204"/>
+                <a:cs typeface="Arial" panose="020B0604020202020204"/>
               </a:rPr>
               <a:t>DEMO</a:t>
             </a:r>
             <a:endParaRPr sz="6500">
-              <a:latin typeface="Arial"/>
-              <a:cs typeface="Arial"/>
+              <a:latin typeface="Arial" panose="020B0604020202020204"/>
+              <a:cs typeface="Arial" panose="020B0604020202020204"/>
             </a:endParaRPr>
           </a:p>
         </p:txBody>
@@ -5583,8 +5513,6 @@
           <a:p>
             <a:fld id="{B6F15528-21DE-4FAA-801E-634DDDAF4B2B}" type="slidenum">
               <a:rPr lang="en-US" smtClean="0"/>
-              <a:pPr/>
-              <a:t>11</a:t>
             </a:fld>
             <a:endParaRPr lang="en-US"/>
           </a:p>
@@ -5648,6 +5576,7 @@
               <a:rPr spc="-5" dirty="0"/>
               <a:t>Summary</a:t>
             </a:r>
+            <a:endParaRPr spc="-5" dirty="0"/>
           </a:p>
         </p:txBody>
       </p:sp>
@@ -5679,7 +5608,7 @@
               <a:spcBef>
                 <a:spcPts val="580"/>
               </a:spcBef>
-              <a:buFont typeface="Wingdings"/>
+              <a:buFont typeface="Wingdings" panose="05000000000000000000"/>
               <a:buChar char=""/>
               <a:tabLst>
                 <a:tab pos="354965" algn="l"/>
@@ -5688,56 +5617,56 @@
             </a:pPr>
             <a:r>
               <a:rPr sz="2000" b="1" spc="-5" dirty="0">
-                <a:latin typeface="Arial"/>
-                <a:cs typeface="Arial"/>
+                <a:latin typeface="Arial" panose="020B0604020202020204"/>
+                <a:cs typeface="Arial" panose="020B0604020202020204"/>
               </a:rPr>
               <a:t>Understand the</a:t>
             </a:r>
             <a:r>
               <a:rPr sz="2000" b="1" dirty="0">
-                <a:latin typeface="Arial"/>
-                <a:cs typeface="Arial"/>
+                <a:latin typeface="Arial" panose="020B0604020202020204"/>
+                <a:cs typeface="Arial" panose="020B0604020202020204"/>
               </a:rPr>
               <a:t> </a:t>
             </a:r>
             <a:r>
               <a:rPr sz="2000" b="1" spc="-5" dirty="0">
-                <a:latin typeface="Arial"/>
-                <a:cs typeface="Arial"/>
+                <a:latin typeface="Arial" panose="020B0604020202020204"/>
+                <a:cs typeface="Arial" panose="020B0604020202020204"/>
               </a:rPr>
               <a:t>methods</a:t>
             </a:r>
             <a:r>
               <a:rPr sz="2000" b="1" spc="5" dirty="0">
-                <a:latin typeface="Arial"/>
-                <a:cs typeface="Arial"/>
+                <a:latin typeface="Arial" panose="020B0604020202020204"/>
+                <a:cs typeface="Arial" panose="020B0604020202020204"/>
               </a:rPr>
               <a:t> </a:t>
             </a:r>
             <a:r>
               <a:rPr sz="2000" b="1" spc="-5" dirty="0">
-                <a:latin typeface="Arial"/>
-                <a:cs typeface="Arial"/>
+                <a:latin typeface="Arial" panose="020B0604020202020204"/>
+                <a:cs typeface="Arial" panose="020B0604020202020204"/>
               </a:rPr>
               <a:t>for</a:t>
             </a:r>
             <a:r>
               <a:rPr sz="2000" b="1" dirty="0">
-                <a:latin typeface="Arial"/>
-                <a:cs typeface="Arial"/>
+                <a:latin typeface="Arial" panose="020B0604020202020204"/>
+                <a:cs typeface="Arial" panose="020B0604020202020204"/>
               </a:rPr>
               <a:t> </a:t>
             </a:r>
             <a:r>
               <a:rPr sz="2000" b="1" spc="-5" dirty="0">
-                <a:latin typeface="Arial"/>
-                <a:cs typeface="Arial"/>
+                <a:latin typeface="Arial" panose="020B0604020202020204"/>
+                <a:cs typeface="Arial" panose="020B0604020202020204"/>
               </a:rPr>
               <a:t>positioning content</a:t>
             </a:r>
             <a:endParaRPr sz="2000">
-              <a:latin typeface="Arial"/>
-              <a:cs typeface="Arial"/>
+              <a:latin typeface="Arial" panose="020B0604020202020204"/>
+              <a:cs typeface="Arial" panose="020B0604020202020204"/>
             </a:endParaRPr>
           </a:p>
           <a:p>
@@ -5748,7 +5677,7 @@
               <a:spcBef>
                 <a:spcPts val="480"/>
               </a:spcBef>
-              <a:buFont typeface="Wingdings"/>
+              <a:buFont typeface="Wingdings" panose="05000000000000000000"/>
               <a:buChar char=""/>
               <a:tabLst>
                 <a:tab pos="354965" algn="l"/>
@@ -5757,56 +5686,56 @@
             </a:pPr>
             <a:r>
               <a:rPr sz="2000" b="1" spc="-5" dirty="0">
-                <a:latin typeface="Arial"/>
-                <a:cs typeface="Arial"/>
+                <a:latin typeface="Arial" panose="020B0604020202020204"/>
+                <a:cs typeface="Arial" panose="020B0604020202020204"/>
               </a:rPr>
               <a:t>Position</a:t>
             </a:r>
             <a:r>
               <a:rPr sz="2000" b="1" spc="-10" dirty="0">
-                <a:latin typeface="Arial"/>
-                <a:cs typeface="Arial"/>
+                <a:latin typeface="Arial" panose="020B0604020202020204"/>
+                <a:cs typeface="Arial" panose="020B0604020202020204"/>
               </a:rPr>
               <a:t> </a:t>
             </a:r>
             <a:r>
               <a:rPr sz="2000" b="1" spc="-5" dirty="0">
-                <a:latin typeface="Arial"/>
-                <a:cs typeface="Arial"/>
+                <a:latin typeface="Arial" panose="020B0604020202020204"/>
+                <a:cs typeface="Arial" panose="020B0604020202020204"/>
               </a:rPr>
               <a:t>multiple</a:t>
             </a:r>
             <a:r>
               <a:rPr sz="2000" b="1" dirty="0">
-                <a:latin typeface="Arial"/>
-                <a:cs typeface="Arial"/>
+                <a:latin typeface="Arial" panose="020B0604020202020204"/>
+                <a:cs typeface="Arial" panose="020B0604020202020204"/>
               </a:rPr>
               <a:t> </a:t>
             </a:r>
             <a:r>
               <a:rPr sz="2000" b="1" spc="-5" dirty="0">
-                <a:latin typeface="Arial"/>
-                <a:cs typeface="Arial"/>
+                <a:latin typeface="Arial" panose="020B0604020202020204"/>
+                <a:cs typeface="Arial" panose="020B0604020202020204"/>
               </a:rPr>
               <a:t>images in </a:t>
             </a:r>
             <a:r>
               <a:rPr sz="2000" b="1" dirty="0">
-                <a:latin typeface="Arial"/>
-                <a:cs typeface="Arial"/>
+                <a:latin typeface="Arial" panose="020B0604020202020204"/>
+                <a:cs typeface="Arial" panose="020B0604020202020204"/>
               </a:rPr>
               <a:t>a</a:t>
             </a:r>
             <a:r>
               <a:rPr sz="2000" b="1" spc="-5" dirty="0">
-                <a:latin typeface="Arial"/>
-                <a:cs typeface="Arial"/>
+                <a:latin typeface="Arial" panose="020B0604020202020204"/>
+                <a:cs typeface="Arial" panose="020B0604020202020204"/>
               </a:rPr>
               <a:t> background</a:t>
             </a:r>
             <a:endParaRPr sz="2000">
-              <a:latin typeface="Arial"/>
-              <a:cs typeface="Arial"/>
+              <a:latin typeface="Arial" panose="020B0604020202020204"/>
+              <a:cs typeface="Arial" panose="020B0604020202020204"/>
             </a:endParaRPr>
           </a:p>
         </p:txBody>
@@ -5828,8 +5757,6 @@
           <a:p>
             <a:fld id="{B6F15528-21DE-4FAA-801E-634DDDAF4B2B}" type="slidenum">
               <a:rPr lang="en-US" smtClean="0"/>
-              <a:pPr/>
-              <a:t>12</a:t>
             </a:fld>
             <a:endParaRPr lang="en-US"/>
           </a:p>
@@ -5905,6 +5832,7 @@
               <a:rPr spc="-5" dirty="0"/>
               <a:t>Overview</a:t>
             </a:r>
+            <a:endParaRPr spc="-5" dirty="0"/>
           </a:p>
         </p:txBody>
       </p:sp>
@@ -5936,7 +5864,7 @@
               <a:spcBef>
                 <a:spcPts val="580"/>
               </a:spcBef>
-              <a:buFont typeface="Wingdings"/>
+              <a:buFont typeface="Wingdings" panose="05000000000000000000"/>
               <a:buChar char=""/>
               <a:tabLst>
                 <a:tab pos="354965" algn="l"/>
@@ -5945,14 +5873,14 @@
             </a:pPr>
             <a:r>
               <a:rPr sz="2000" b="1" spc="-5" dirty="0">
-                <a:latin typeface="Arial"/>
-                <a:cs typeface="Arial"/>
+                <a:latin typeface="Arial" panose="020B0604020202020204"/>
+                <a:cs typeface="Arial" panose="020B0604020202020204"/>
               </a:rPr>
               <a:t>Layout</a:t>
             </a:r>
             <a:endParaRPr sz="2000">
-              <a:latin typeface="Arial"/>
-              <a:cs typeface="Arial"/>
+              <a:latin typeface="Arial" panose="020B0604020202020204"/>
+              <a:cs typeface="Arial" panose="020B0604020202020204"/>
             </a:endParaRPr>
           </a:p>
           <a:p>
@@ -5963,7 +5891,7 @@
               <a:spcBef>
                 <a:spcPts val="480"/>
               </a:spcBef>
-              <a:buFont typeface="Wingdings"/>
+              <a:buFont typeface="Wingdings" panose="05000000000000000000"/>
               <a:buChar char=""/>
               <a:tabLst>
                 <a:tab pos="354965" algn="l"/>
@@ -5972,14 +5900,14 @@
             </a:pPr>
             <a:r>
               <a:rPr sz="2000" b="1" spc="-5" dirty="0">
-                <a:latin typeface="Arial"/>
-                <a:cs typeface="Arial"/>
+                <a:latin typeface="Arial" panose="020B0604020202020204"/>
+                <a:cs typeface="Arial" panose="020B0604020202020204"/>
               </a:rPr>
               <a:t>Background</a:t>
             </a:r>
             <a:endParaRPr sz="2000">
-              <a:latin typeface="Arial"/>
-              <a:cs typeface="Arial"/>
+              <a:latin typeface="Arial" panose="020B0604020202020204"/>
+              <a:cs typeface="Arial" panose="020B0604020202020204"/>
             </a:endParaRPr>
           </a:p>
           <a:p>
@@ -5990,7 +5918,7 @@
               <a:spcBef>
                 <a:spcPts val="400"/>
               </a:spcBef>
-              <a:buFont typeface="Wingdings"/>
+              <a:buFont typeface="Wingdings" panose="05000000000000000000"/>
               <a:buChar char=""/>
               <a:tabLst>
                 <a:tab pos="354965" algn="l"/>
@@ -5999,14 +5927,14 @@
             </a:pPr>
             <a:r>
               <a:rPr sz="2000" b="1" spc="-5" dirty="0">
-                <a:latin typeface="Arial"/>
-                <a:cs typeface="Arial"/>
+                <a:latin typeface="Arial" panose="020B0604020202020204"/>
+                <a:cs typeface="Arial" panose="020B0604020202020204"/>
               </a:rPr>
               <a:t>Summary</a:t>
             </a:r>
             <a:endParaRPr sz="2000">
-              <a:latin typeface="Arial"/>
-              <a:cs typeface="Arial"/>
+              <a:latin typeface="Arial" panose="020B0604020202020204"/>
+              <a:cs typeface="Arial" panose="020B0604020202020204"/>
             </a:endParaRPr>
           </a:p>
         </p:txBody>
@@ -6028,8 +5956,6 @@
           <a:p>
             <a:fld id="{B6F15528-21DE-4FAA-801E-634DDDAF4B2B}" type="slidenum">
               <a:rPr lang="en-US" smtClean="0"/>
-              <a:pPr/>
-              <a:t>2</a:t>
             </a:fld>
             <a:endParaRPr lang="en-US"/>
           </a:p>
@@ -6172,35 +6098,35 @@
             </a:pPr>
             <a:r>
               <a:rPr sz="2800" b="1" spc="-5" dirty="0">
-                <a:latin typeface="Arial"/>
-                <a:cs typeface="Arial"/>
+                <a:latin typeface="Arial" panose="020B0604020202020204"/>
+                <a:cs typeface="Arial" panose="020B0604020202020204"/>
               </a:rPr>
               <a:t>L</a:t>
             </a:r>
             <a:r>
               <a:rPr sz="2800" b="1" dirty="0">
-                <a:latin typeface="Arial"/>
-                <a:cs typeface="Arial"/>
+                <a:latin typeface="Arial" panose="020B0604020202020204"/>
+                <a:cs typeface="Arial" panose="020B0604020202020204"/>
               </a:rPr>
               <a:t>ay</a:t>
             </a:r>
             <a:r>
               <a:rPr sz="2800" b="1" spc="-5" dirty="0">
-                <a:latin typeface="Arial"/>
-                <a:cs typeface="Arial"/>
+                <a:latin typeface="Arial" panose="020B0604020202020204"/>
+                <a:cs typeface="Arial" panose="020B0604020202020204"/>
               </a:rPr>
               <a:t>ou</a:t>
             </a:r>
             <a:r>
               <a:rPr sz="2800" b="1" dirty="0">
-                <a:latin typeface="Arial"/>
-                <a:cs typeface="Arial"/>
+                <a:latin typeface="Arial" panose="020B0604020202020204"/>
+                <a:cs typeface="Arial" panose="020B0604020202020204"/>
               </a:rPr>
               <a:t>t</a:t>
             </a:r>
             <a:endParaRPr sz="2800">
-              <a:latin typeface="Arial"/>
-              <a:cs typeface="Arial"/>
+              <a:latin typeface="Arial" panose="020B0604020202020204"/>
+              <a:cs typeface="Arial" panose="020B0604020202020204"/>
             </a:endParaRPr>
           </a:p>
         </p:txBody>
@@ -6222,8 +6148,6 @@
           <a:p>
             <a:fld id="{B6F15528-21DE-4FAA-801E-634DDDAF4B2B}" type="slidenum">
               <a:rPr lang="en-US" smtClean="0"/>
-              <a:pPr/>
-              <a:t>3</a:t>
             </a:fld>
             <a:endParaRPr lang="en-US"/>
           </a:p>
@@ -6299,6 +6223,7 @@
               <a:rPr spc="-5" dirty="0"/>
               <a:t>Layout</a:t>
             </a:r>
+            <a:endParaRPr spc="-5" dirty="0"/>
           </a:p>
         </p:txBody>
       </p:sp>
@@ -6361,9 +6286,7 @@
           <p:txBody>
             <a:bodyPr wrap="square" lIns="0" tIns="0" rIns="0" bIns="0" rtlCol="0"/>
             <a:lstStyle/>
-            <a:p>
-              <a:endParaRPr/>
-            </a:p>
+            <a:p/>
           </p:txBody>
         </p:sp>
         <p:sp>
@@ -6413,9 +6336,7 @@
           <p:txBody>
             <a:bodyPr wrap="square" lIns="0" tIns="0" rIns="0" bIns="0" rtlCol="0"/>
             <a:lstStyle/>
-            <a:p>
-              <a:endParaRPr/>
-            </a:p>
+            <a:p/>
           </p:txBody>
         </p:sp>
       </p:grpSp>
@@ -6427,7 +6348,7 @@
         </p:nvSpPr>
         <p:spPr>
           <a:xfrm>
-            <a:off x="3303124" y="1954783"/>
+            <a:off x="3124054" y="2286253"/>
             <a:ext cx="767080" cy="299720"/>
           </a:xfrm>
           <a:prstGeom prst="rect">
@@ -6450,14 +6371,14 @@
             </a:pPr>
             <a:r>
               <a:rPr sz="1800" dirty="0">
-                <a:latin typeface="Consolas"/>
-                <a:cs typeface="Consolas"/>
+                <a:latin typeface="Consolas" panose="020B0609020204030204"/>
+                <a:cs typeface="Consolas" panose="020B0609020204030204"/>
               </a:rPr>
               <a:t>table;</a:t>
             </a:r>
             <a:endParaRPr sz="1800">
-              <a:latin typeface="Consolas"/>
-              <a:cs typeface="Consolas"/>
+              <a:latin typeface="Consolas" panose="020B0609020204030204"/>
+              <a:cs typeface="Consolas" panose="020B0609020204030204"/>
             </a:endParaRPr>
           </a:p>
         </p:txBody>
@@ -6485,7 +6406,7 @@
           <a:p>
             <a:pPr marL="342265" marR="5080" indent="-342900">
               <a:lnSpc>
-                <a:spcPct val="117200"/>
+                <a:spcPct val="117000"/>
               </a:lnSpc>
               <a:spcBef>
                 <a:spcPts val="100"/>
@@ -6493,42 +6414,42 @@
             </a:pPr>
             <a:r>
               <a:rPr sz="1800" dirty="0">
-                <a:latin typeface="Consolas"/>
-                <a:cs typeface="Consolas"/>
+                <a:latin typeface="Consolas" panose="020B0609020204030204"/>
+                <a:cs typeface="Consolas" panose="020B0609020204030204"/>
               </a:rPr>
               <a:t>#outerDiv</a:t>
             </a:r>
             <a:r>
               <a:rPr sz="1800" spc="-100" dirty="0">
-                <a:latin typeface="Consolas"/>
-                <a:cs typeface="Consolas"/>
+                <a:latin typeface="Consolas" panose="020B0609020204030204"/>
+                <a:cs typeface="Consolas" panose="020B0609020204030204"/>
               </a:rPr>
               <a:t> </a:t>
             </a:r>
             <a:r>
               <a:rPr sz="1800" dirty="0">
-                <a:latin typeface="Consolas"/>
-                <a:cs typeface="Consolas"/>
+                <a:latin typeface="Consolas" panose="020B0609020204030204"/>
+                <a:cs typeface="Consolas" panose="020B0609020204030204"/>
               </a:rPr>
               <a:t>{ </a:t>
             </a:r>
             <a:r>
               <a:rPr sz="1800" spc="-975" dirty="0">
-                <a:latin typeface="Consolas"/>
-                <a:cs typeface="Consolas"/>
+                <a:latin typeface="Consolas" panose="020B0609020204030204"/>
+                <a:cs typeface="Consolas" panose="020B0609020204030204"/>
               </a:rPr>
               <a:t> </a:t>
             </a:r>
             <a:r>
               <a:rPr sz="1800" dirty="0">
-                <a:latin typeface="Consolas"/>
-                <a:cs typeface="Consolas"/>
+                <a:latin typeface="Consolas" panose="020B0609020204030204"/>
+                <a:cs typeface="Consolas" panose="020B0609020204030204"/>
               </a:rPr>
               <a:t>display:</a:t>
             </a:r>
             <a:endParaRPr sz="1800">
-              <a:latin typeface="Consolas"/>
-              <a:cs typeface="Consolas"/>
+              <a:latin typeface="Consolas" panose="020B0609020204030204"/>
+              <a:cs typeface="Consolas" panose="020B0609020204030204"/>
             </a:endParaRPr>
           </a:p>
           <a:p>
@@ -6542,14 +6463,14 @@
             </a:pPr>
             <a:r>
               <a:rPr sz="1800" dirty="0">
-                <a:latin typeface="Consolas"/>
-                <a:cs typeface="Consolas"/>
+                <a:latin typeface="Consolas" panose="020B0609020204030204"/>
+                <a:cs typeface="Consolas" panose="020B0609020204030204"/>
               </a:rPr>
               <a:t>}</a:t>
             </a:r>
             <a:endParaRPr sz="1800">
-              <a:latin typeface="Consolas"/>
-              <a:cs typeface="Consolas"/>
+              <a:latin typeface="Consolas" panose="020B0609020204030204"/>
+              <a:cs typeface="Consolas" panose="020B0609020204030204"/>
             </a:endParaRPr>
           </a:p>
         </p:txBody>
@@ -6577,7 +6498,7 @@
           <a:p>
             <a:pPr marR="1353820">
               <a:lnSpc>
-                <a:spcPct val="120400"/>
+                <a:spcPct val="120000"/>
               </a:lnSpc>
               <a:spcBef>
                 <a:spcPts val="100"/>
@@ -6585,42 +6506,42 @@
             </a:pPr>
             <a:r>
               <a:rPr sz="1800" dirty="0">
-                <a:latin typeface="Consolas"/>
-                <a:cs typeface="Consolas"/>
+                <a:latin typeface="Consolas" panose="020B0609020204030204"/>
+                <a:cs typeface="Consolas" panose="020B0609020204030204"/>
               </a:rPr>
               <a:t>#firstChild, </a:t>
             </a:r>
             <a:r>
               <a:rPr sz="1800" spc="5" dirty="0">
-                <a:latin typeface="Consolas"/>
-                <a:cs typeface="Consolas"/>
+                <a:latin typeface="Consolas" panose="020B0609020204030204"/>
+                <a:cs typeface="Consolas" panose="020B0609020204030204"/>
               </a:rPr>
               <a:t> </a:t>
             </a:r>
             <a:r>
               <a:rPr sz="1800" dirty="0">
-                <a:latin typeface="Consolas"/>
-                <a:cs typeface="Consolas"/>
+                <a:latin typeface="Consolas" panose="020B0609020204030204"/>
+                <a:cs typeface="Consolas" panose="020B0609020204030204"/>
               </a:rPr>
               <a:t>#secondChild</a:t>
             </a:r>
             <a:r>
               <a:rPr sz="1800" spc="-100" dirty="0">
-                <a:latin typeface="Consolas"/>
-                <a:cs typeface="Consolas"/>
+                <a:latin typeface="Consolas" panose="020B0609020204030204"/>
+                <a:cs typeface="Consolas" panose="020B0609020204030204"/>
               </a:rPr>
               <a:t> </a:t>
             </a:r>
             <a:r>
               <a:rPr sz="1800" dirty="0">
-                <a:latin typeface="Consolas"/>
-                <a:cs typeface="Consolas"/>
+                <a:latin typeface="Consolas" panose="020B0609020204030204"/>
+                <a:cs typeface="Consolas" panose="020B0609020204030204"/>
               </a:rPr>
               <a:t>{</a:t>
             </a:r>
             <a:endParaRPr sz="1800">
-              <a:latin typeface="Consolas"/>
-              <a:cs typeface="Consolas"/>
+              <a:latin typeface="Consolas" panose="020B0609020204030204"/>
+              <a:cs typeface="Consolas" panose="020B0609020204030204"/>
             </a:endParaRPr>
           </a:p>
           <a:p>
@@ -6629,7 +6550,7 @@
                 <a:spcPct val="100000"/>
               </a:lnSpc>
               <a:spcBef>
-                <a:spcPts val="439"/>
+                <a:spcPts val="440"/>
               </a:spcBef>
               <a:tabLst>
                 <a:tab pos="1725295" algn="l"/>
@@ -6637,21 +6558,21 @@
             </a:pPr>
             <a:r>
               <a:rPr sz="1800" dirty="0">
-                <a:latin typeface="Consolas"/>
-                <a:cs typeface="Consolas"/>
+                <a:latin typeface="Consolas" panose="020B0609020204030204"/>
+                <a:cs typeface="Consolas" panose="020B0609020204030204"/>
               </a:rPr>
               <a:t>display:	</a:t>
             </a:r>
             <a:r>
               <a:rPr sz="1800" spc="-155" dirty="0">
-                <a:latin typeface="Consolas"/>
-                <a:cs typeface="Consolas"/>
+                <a:latin typeface="Consolas" panose="020B0609020204030204"/>
+                <a:cs typeface="Consolas" panose="020B0609020204030204"/>
               </a:rPr>
               <a:t>table-­‐cell;</a:t>
             </a:r>
             <a:endParaRPr sz="1800">
-              <a:latin typeface="Consolas"/>
-              <a:cs typeface="Consolas"/>
+              <a:latin typeface="Consolas" panose="020B0609020204030204"/>
+              <a:cs typeface="Consolas" panose="020B0609020204030204"/>
             </a:endParaRPr>
           </a:p>
           <a:p>
@@ -6660,19 +6581,19 @@
                 <a:spcPct val="100000"/>
               </a:lnSpc>
               <a:spcBef>
-                <a:spcPts val="439"/>
+                <a:spcPts val="440"/>
               </a:spcBef>
             </a:pPr>
             <a:r>
               <a:rPr sz="1800" dirty="0">
-                <a:latin typeface="Consolas"/>
-                <a:cs typeface="Consolas"/>
+                <a:latin typeface="Consolas" panose="020B0609020204030204"/>
+                <a:cs typeface="Consolas" panose="020B0609020204030204"/>
               </a:rPr>
               <a:t>}</a:t>
             </a:r>
             <a:endParaRPr sz="1800">
-              <a:latin typeface="Consolas"/>
-              <a:cs typeface="Consolas"/>
+              <a:latin typeface="Consolas" panose="020B0609020204030204"/>
+              <a:cs typeface="Consolas" panose="020B0609020204030204"/>
             </a:endParaRPr>
           </a:p>
         </p:txBody>
@@ -6698,7 +6619,7 @@
             <p:nvPr/>
           </p:nvPicPr>
           <p:blipFill>
-            <a:blip r:embed="rId2" cstate="print"/>
+            <a:blip r:embed="rId1" cstate="print"/>
             <a:stretch>
               <a:fillRect/>
             </a:stretch>
@@ -6758,9 +6679,7 @@
           <p:txBody>
             <a:bodyPr wrap="square" lIns="0" tIns="0" rIns="0" bIns="0" rtlCol="0"/>
             <a:lstStyle/>
-            <a:p>
-              <a:endParaRPr/>
-            </a:p>
+            <a:p/>
           </p:txBody>
         </p:sp>
         <p:sp>
@@ -6810,9 +6729,7 @@
           <p:txBody>
             <a:bodyPr wrap="square" lIns="0" tIns="0" rIns="0" bIns="0" rtlCol="0"/>
             <a:lstStyle/>
-            <a:p>
-              <a:endParaRPr/>
-            </a:p>
+            <a:p/>
           </p:txBody>
         </p:sp>
         <p:pic>
@@ -6822,7 +6739,7 @@
             <p:nvPr/>
           </p:nvPicPr>
           <p:blipFill>
-            <a:blip r:embed="rId3" cstate="print"/>
+            <a:blip r:embed="rId2" cstate="print"/>
             <a:stretch>
               <a:fillRect/>
             </a:stretch>
@@ -6844,7 +6761,7 @@
             <p:nvPr/>
           </p:nvPicPr>
           <p:blipFill>
-            <a:blip r:embed="rId4" cstate="print"/>
+            <a:blip r:embed="rId3" cstate="print"/>
             <a:stretch>
               <a:fillRect/>
             </a:stretch>
@@ -6866,7 +6783,7 @@
             <p:nvPr/>
           </p:nvPicPr>
           <p:blipFill>
-            <a:blip r:embed="rId5" cstate="print"/>
+            <a:blip r:embed="rId4" cstate="print"/>
             <a:stretch>
               <a:fillRect/>
             </a:stretch>
@@ -7036,9 +6953,7 @@
           <p:txBody>
             <a:bodyPr wrap="square" lIns="0" tIns="0" rIns="0" bIns="0" rtlCol="0"/>
             <a:lstStyle/>
-            <a:p>
-              <a:endParaRPr/>
-            </a:p>
+            <a:p/>
           </p:txBody>
         </p:sp>
       </p:grpSp>
@@ -7106,7 +7021,7 @@
             <p:nvPr/>
           </p:nvPicPr>
           <p:blipFill>
-            <a:blip r:embed="rId6" cstate="print"/>
+            <a:blip r:embed="rId5" cstate="print"/>
             <a:stretch>
               <a:fillRect/>
             </a:stretch>
@@ -7128,7 +7043,7 @@
             <p:nvPr/>
           </p:nvPicPr>
           <p:blipFill>
-            <a:blip r:embed="rId7" cstate="print"/>
+            <a:blip r:embed="rId6" cstate="print"/>
             <a:stretch>
               <a:fillRect/>
             </a:stretch>
@@ -7298,9 +7213,7 @@
           <p:txBody>
             <a:bodyPr wrap="square" lIns="0" tIns="0" rIns="0" bIns="0" rtlCol="0"/>
             <a:lstStyle/>
-            <a:p>
-              <a:endParaRPr/>
-            </a:p>
+            <a:p/>
           </p:txBody>
         </p:sp>
       </p:grpSp>
@@ -7364,8 +7277,6 @@
           <a:p>
             <a:fld id="{B6F15528-21DE-4FAA-801E-634DDDAF4B2B}" type="slidenum">
               <a:rPr lang="en-US" smtClean="0"/>
-              <a:pPr/>
-              <a:t>4</a:t>
             </a:fld>
             <a:endParaRPr lang="en-US"/>
           </a:p>
@@ -7441,6 +7352,7 @@
               <a:rPr spc="-5" dirty="0"/>
               <a:t>Layout</a:t>
             </a:r>
+            <a:endParaRPr spc="-5" dirty="0"/>
           </a:p>
         </p:txBody>
       </p:sp>
@@ -7503,9 +7415,7 @@
           <p:txBody>
             <a:bodyPr wrap="square" lIns="0" tIns="0" rIns="0" bIns="0" rtlCol="0"/>
             <a:lstStyle/>
-            <a:p>
-              <a:endParaRPr/>
-            </a:p>
+            <a:p/>
           </p:txBody>
         </p:sp>
         <p:sp>
@@ -7555,9 +7465,7 @@
           <p:txBody>
             <a:bodyPr wrap="square" lIns="0" tIns="0" rIns="0" bIns="0" rtlCol="0"/>
             <a:lstStyle/>
-            <a:p>
-              <a:endParaRPr/>
-            </a:p>
+            <a:p/>
           </p:txBody>
         </p:sp>
       </p:grpSp>
@@ -7592,14 +7500,14 @@
             </a:pPr>
             <a:r>
               <a:rPr sz="1800" dirty="0">
-                <a:latin typeface="Consolas"/>
-                <a:cs typeface="Consolas"/>
+                <a:latin typeface="Consolas" panose="020B0609020204030204"/>
+                <a:cs typeface="Consolas" panose="020B0609020204030204"/>
               </a:rPr>
               <a:t>box;</a:t>
             </a:r>
             <a:endParaRPr sz="1800">
-              <a:latin typeface="Consolas"/>
-              <a:cs typeface="Consolas"/>
+              <a:latin typeface="Consolas" panose="020B0609020204030204"/>
+              <a:cs typeface="Consolas" panose="020B0609020204030204"/>
             </a:endParaRPr>
           </a:p>
         </p:txBody>
@@ -7635,42 +7543,42 @@
             </a:pPr>
             <a:r>
               <a:rPr sz="1800" dirty="0">
-                <a:latin typeface="Consolas"/>
-                <a:cs typeface="Consolas"/>
+                <a:latin typeface="Consolas" panose="020B0609020204030204"/>
+                <a:cs typeface="Consolas" panose="020B0609020204030204"/>
               </a:rPr>
               <a:t>2;</a:t>
             </a:r>
             <a:r>
               <a:rPr sz="1800" spc="-50" dirty="0">
-                <a:latin typeface="Consolas"/>
-                <a:cs typeface="Consolas"/>
+                <a:latin typeface="Consolas" panose="020B0609020204030204"/>
+                <a:cs typeface="Consolas" panose="020B0609020204030204"/>
               </a:rPr>
               <a:t> </a:t>
             </a:r>
             <a:r>
               <a:rPr sz="1800" spc="-180" dirty="0">
-                <a:latin typeface="Consolas"/>
-                <a:cs typeface="Consolas"/>
+                <a:latin typeface="Consolas" panose="020B0609020204030204"/>
+                <a:cs typeface="Consolas" panose="020B0609020204030204"/>
               </a:rPr>
               <a:t>box-­‐flex:</a:t>
             </a:r>
             <a:r>
               <a:rPr sz="1800" spc="-45" dirty="0">
-                <a:latin typeface="Consolas"/>
-                <a:cs typeface="Consolas"/>
+                <a:latin typeface="Consolas" panose="020B0609020204030204"/>
+                <a:cs typeface="Consolas" panose="020B0609020204030204"/>
               </a:rPr>
               <a:t> </a:t>
             </a:r>
             <a:r>
               <a:rPr sz="1800" dirty="0">
-                <a:latin typeface="Consolas"/>
-                <a:cs typeface="Consolas"/>
+                <a:latin typeface="Consolas" panose="020B0609020204030204"/>
+                <a:cs typeface="Consolas" panose="020B0609020204030204"/>
               </a:rPr>
               <a:t>1;</a:t>
             </a:r>
             <a:endParaRPr sz="1800">
-              <a:latin typeface="Consolas"/>
-              <a:cs typeface="Consolas"/>
+              <a:latin typeface="Consolas" panose="020B0609020204030204"/>
+              <a:cs typeface="Consolas" panose="020B0609020204030204"/>
             </a:endParaRPr>
           </a:p>
         </p:txBody>
@@ -7686,6 +7594,10 @@
           </p:nvPr>
         </p:nvSpPr>
         <p:spPr>
+          <a:xfrm>
+            <a:off x="1564640" y="1586230"/>
+            <a:ext cx="3571875" cy="3978910"/>
+          </a:xfrm>
           <a:prstGeom prst="rect">
             <a:avLst/>
           </a:prstGeom>
@@ -7696,9 +7608,9 @@
           </a:bodyPr>
           <a:lstStyle/>
           <a:p>
-            <a:pPr marL="354965" marR="1764664" indent="-342900">
+            <a:pPr marL="354965" marR="1764665" indent="-342900">
               <a:lnSpc>
-                <a:spcPct val="117200"/>
+                <a:spcPct val="117000"/>
               </a:lnSpc>
               <a:spcBef>
                 <a:spcPts val="100"/>
@@ -7716,6 +7628,7 @@
               <a:rPr dirty="0"/>
               <a:t>display:</a:t>
             </a:r>
+            <a:endParaRPr dirty="0"/>
           </a:p>
           <a:p>
             <a:pPr marL="12700">
@@ -7730,6 +7643,7 @@
               <a:rPr dirty="0"/>
               <a:t>}</a:t>
             </a:r>
+            <a:endParaRPr dirty="0"/>
           </a:p>
           <a:p>
             <a:pPr marL="12700">
@@ -7768,6 +7682,7 @@
               <a:rPr dirty="0"/>
               <a:t>{</a:t>
             </a:r>
+            <a:endParaRPr dirty="0"/>
           </a:p>
           <a:p>
             <a:pPr marL="354965">
@@ -7785,6 +7700,7 @@
               <a:rPr spc="-180" dirty="0"/>
               <a:t>box-­‐ordinal-­‐group:	1;</a:t>
             </a:r>
+            <a:endParaRPr spc="-180" dirty="0"/>
           </a:p>
           <a:p>
             <a:pPr marL="12700">
@@ -7799,16 +7715,29 @@
               <a:rPr dirty="0"/>
               <a:t>}</a:t>
             </a:r>
+            <a:endParaRPr dirty="0"/>
           </a:p>
           <a:p>
             <a:pPr marL="354965" marR="507365" indent="-342900">
               <a:lnSpc>
-                <a:spcPct val="120400"/>
+                <a:spcPct val="120000"/>
               </a:lnSpc>
             </a:pPr>
             <a:r>
               <a:rPr dirty="0"/>
-              <a:t>#content &gt; article { </a:t>
+              <a:t>#content &gt; article </a:t>
+            </a:r>
+            <a:endParaRPr dirty="0"/>
+          </a:p>
+          <a:p>
+            <a:pPr marL="354965" marR="507365" indent="-342900">
+              <a:lnSpc>
+                <a:spcPct val="120000"/>
+              </a:lnSpc>
+            </a:pPr>
+            <a:r>
+              <a:rPr dirty="0"/>
+              <a:t>{ </a:t>
             </a:r>
             <a:r>
               <a:rPr spc="-975" dirty="0"/>
@@ -7818,6 +7747,11 @@
               <a:rPr spc="-180" dirty="0"/>
               <a:t>box-­‐ordinal-­‐group:</a:t>
             </a:r>
+            <a:r>
+              <a:rPr lang="en-US" spc="-180" dirty="0"/>
+              <a:t> </a:t>
+            </a:r>
+            <a:endParaRPr spc="-180" dirty="0"/>
           </a:p>
           <a:p>
             <a:pPr marL="12700">
@@ -7825,13 +7759,14 @@
                 <a:spcPct val="100000"/>
               </a:lnSpc>
               <a:spcBef>
-                <a:spcPts val="439"/>
+                <a:spcPts val="440"/>
               </a:spcBef>
             </a:pPr>
             <a:r>
               <a:rPr dirty="0"/>
               <a:t>}</a:t>
             </a:r>
+            <a:endParaRPr dirty="0"/>
           </a:p>
           <a:p>
             <a:pPr marL="12700">
@@ -7870,6 +7805,7 @@
               <a:rPr dirty="0"/>
               <a:t>{</a:t>
             </a:r>
+            <a:endParaRPr dirty="0"/>
           </a:p>
           <a:p>
             <a:pPr marL="354965">
@@ -7877,7 +7813,7 @@
                 <a:spcPct val="100000"/>
               </a:lnSpc>
               <a:spcBef>
-                <a:spcPts val="439"/>
+                <a:spcPts val="440"/>
               </a:spcBef>
               <a:tabLst>
                 <a:tab pos="2869565" algn="l"/>
@@ -7887,6 +7823,7 @@
               <a:rPr spc="-180" dirty="0"/>
               <a:t>box-­‐ordinal-­‐group:	3;</a:t>
             </a:r>
+            <a:endParaRPr spc="-180" dirty="0"/>
           </a:p>
           <a:p>
             <a:pPr marL="12700">
@@ -7894,13 +7831,14 @@
                 <a:spcPct val="100000"/>
               </a:lnSpc>
               <a:spcBef>
-                <a:spcPts val="439"/>
+                <a:spcPts val="440"/>
               </a:spcBef>
             </a:pPr>
             <a:r>
               <a:rPr dirty="0"/>
               <a:t>}</a:t>
             </a:r>
+            <a:endParaRPr dirty="0"/>
           </a:p>
         </p:txBody>
       </p:sp>
@@ -7925,7 +7863,7 @@
             <p:nvPr/>
           </p:nvPicPr>
           <p:blipFill>
-            <a:blip r:embed="rId2" cstate="print"/>
+            <a:blip r:embed="rId1" cstate="print"/>
             <a:stretch>
               <a:fillRect/>
             </a:stretch>
@@ -7947,7 +7885,7 @@
             <p:nvPr/>
           </p:nvPicPr>
           <p:blipFill>
-            <a:blip r:embed="rId3" cstate="print"/>
+            <a:blip r:embed="rId2" cstate="print"/>
             <a:stretch>
               <a:fillRect/>
             </a:stretch>
@@ -8007,9 +7945,7 @@
           <p:txBody>
             <a:bodyPr wrap="square" lIns="0" tIns="0" rIns="0" bIns="0" rtlCol="0"/>
             <a:lstStyle/>
-            <a:p>
-              <a:endParaRPr/>
-            </a:p>
+            <a:p/>
           </p:txBody>
         </p:sp>
         <p:sp>
@@ -8059,9 +7995,7 @@
           <p:txBody>
             <a:bodyPr wrap="square" lIns="0" tIns="0" rIns="0" bIns="0" rtlCol="0"/>
             <a:lstStyle/>
-            <a:p>
-              <a:endParaRPr/>
-            </a:p>
+            <a:p/>
           </p:txBody>
         </p:sp>
       </p:grpSp>
@@ -8091,33 +8025,33 @@
                 <a:spcPct val="100000"/>
               </a:lnSpc>
               <a:spcBef>
-                <a:spcPts val="359"/>
+                <a:spcPts val="360"/>
               </a:spcBef>
             </a:pPr>
             <a:r>
               <a:rPr sz="1800" dirty="0">
-                <a:latin typeface="Consolas"/>
-                <a:cs typeface="Consolas"/>
+                <a:latin typeface="Consolas" panose="020B0609020204030204"/>
+                <a:cs typeface="Consolas" panose="020B0609020204030204"/>
               </a:rPr>
               <a:t>&lt;div</a:t>
             </a:r>
             <a:r>
               <a:rPr sz="1800" spc="-65" dirty="0">
-                <a:latin typeface="Consolas"/>
-                <a:cs typeface="Consolas"/>
+                <a:latin typeface="Consolas" panose="020B0609020204030204"/>
+                <a:cs typeface="Consolas" panose="020B0609020204030204"/>
               </a:rPr>
               <a:t> </a:t>
             </a:r>
             <a:r>
               <a:rPr sz="1800" dirty="0">
-                <a:latin typeface="Consolas"/>
-                <a:cs typeface="Consolas"/>
+                <a:latin typeface="Consolas" panose="020B0609020204030204"/>
+                <a:cs typeface="Consolas" panose="020B0609020204030204"/>
               </a:rPr>
               <a:t>id='content'&gt;</a:t>
             </a:r>
             <a:endParaRPr sz="1800">
-              <a:latin typeface="Consolas"/>
-              <a:cs typeface="Consolas"/>
+              <a:latin typeface="Consolas" panose="020B0609020204030204"/>
+              <a:cs typeface="Consolas" panose="020B0609020204030204"/>
             </a:endParaRPr>
           </a:p>
           <a:p>
@@ -8131,14 +8065,14 @@
             </a:pPr>
             <a:r>
               <a:rPr sz="1800" dirty="0">
-                <a:latin typeface="Consolas"/>
-                <a:cs typeface="Consolas"/>
+                <a:latin typeface="Consolas" panose="020B0609020204030204"/>
+                <a:cs typeface="Consolas" panose="020B0609020204030204"/>
               </a:rPr>
               <a:t>&lt;article&gt;&lt;/article&gt;</a:t>
             </a:r>
             <a:endParaRPr sz="1800">
-              <a:latin typeface="Consolas"/>
-              <a:cs typeface="Consolas"/>
+              <a:latin typeface="Consolas" panose="020B0609020204030204"/>
+              <a:cs typeface="Consolas" panose="020B0609020204030204"/>
             </a:endParaRPr>
           </a:p>
           <a:p>
@@ -8152,14 +8086,14 @@
             </a:pPr>
             <a:r>
               <a:rPr sz="1800" dirty="0">
-                <a:latin typeface="Consolas"/>
-                <a:cs typeface="Consolas"/>
+                <a:latin typeface="Consolas" panose="020B0609020204030204"/>
+                <a:cs typeface="Consolas" panose="020B0609020204030204"/>
               </a:rPr>
               <a:t>&lt;aside&lt;/aside&gt;</a:t>
             </a:r>
             <a:endParaRPr sz="1800">
-              <a:latin typeface="Consolas"/>
-              <a:cs typeface="Consolas"/>
+              <a:latin typeface="Consolas" panose="020B0609020204030204"/>
+              <a:cs typeface="Consolas" panose="020B0609020204030204"/>
             </a:endParaRPr>
           </a:p>
           <a:p>
@@ -8173,14 +8107,14 @@
             </a:pPr>
             <a:r>
               <a:rPr sz="1800" dirty="0">
-                <a:latin typeface="Consolas"/>
-                <a:cs typeface="Consolas"/>
+                <a:latin typeface="Consolas" panose="020B0609020204030204"/>
+                <a:cs typeface="Consolas" panose="020B0609020204030204"/>
               </a:rPr>
               <a:t>&lt;nav&gt;&lt;/nav&gt;</a:t>
             </a:r>
             <a:endParaRPr sz="1800">
-              <a:latin typeface="Consolas"/>
-              <a:cs typeface="Consolas"/>
+              <a:latin typeface="Consolas" panose="020B0609020204030204"/>
+              <a:cs typeface="Consolas" panose="020B0609020204030204"/>
             </a:endParaRPr>
           </a:p>
           <a:p>
@@ -8194,14 +8128,14 @@
             </a:pPr>
             <a:r>
               <a:rPr sz="1800" dirty="0">
-                <a:latin typeface="Consolas"/>
-                <a:cs typeface="Consolas"/>
+                <a:latin typeface="Consolas" panose="020B0609020204030204"/>
+                <a:cs typeface="Consolas" panose="020B0609020204030204"/>
               </a:rPr>
               <a:t>&lt;/div&gt;</a:t>
             </a:r>
             <a:endParaRPr sz="1800">
-              <a:latin typeface="Consolas"/>
-              <a:cs typeface="Consolas"/>
+              <a:latin typeface="Consolas" panose="020B0609020204030204"/>
+              <a:cs typeface="Consolas" panose="020B0609020204030204"/>
             </a:endParaRPr>
           </a:p>
         </p:txBody>
@@ -8227,7 +8161,7 @@
             <p:nvPr/>
           </p:nvPicPr>
           <p:blipFill>
-            <a:blip r:embed="rId4" cstate="print"/>
+            <a:blip r:embed="rId3" cstate="print"/>
             <a:stretch>
               <a:fillRect/>
             </a:stretch>
@@ -8287,9 +8221,7 @@
           <p:txBody>
             <a:bodyPr wrap="square" lIns="0" tIns="0" rIns="0" bIns="0" rtlCol="0"/>
             <a:lstStyle/>
-            <a:p>
-              <a:endParaRPr/>
-            </a:p>
+            <a:p/>
           </p:txBody>
         </p:sp>
         <p:sp>
@@ -8339,9 +8271,7 @@
           <p:txBody>
             <a:bodyPr wrap="square" lIns="0" tIns="0" rIns="0" bIns="0" rtlCol="0"/>
             <a:lstStyle/>
-            <a:p>
-              <a:endParaRPr/>
-            </a:p>
+            <a:p/>
           </p:txBody>
         </p:sp>
         <p:pic>
@@ -8351,7 +8281,7 @@
             <p:nvPr/>
           </p:nvPicPr>
           <p:blipFill>
-            <a:blip r:embed="rId5" cstate="print"/>
+            <a:blip r:embed="rId4" cstate="print"/>
             <a:stretch>
               <a:fillRect/>
             </a:stretch>
@@ -8373,7 +8303,7 @@
             <p:nvPr/>
           </p:nvPicPr>
           <p:blipFill>
-            <a:blip r:embed="rId6" cstate="print"/>
+            <a:blip r:embed="rId5" cstate="print"/>
             <a:stretch>
               <a:fillRect/>
             </a:stretch>
@@ -8395,7 +8325,7 @@
             <p:nvPr/>
           </p:nvPicPr>
           <p:blipFill>
-            <a:blip r:embed="rId7" cstate="print"/>
+            <a:blip r:embed="rId6" cstate="print"/>
             <a:stretch>
               <a:fillRect/>
             </a:stretch>
@@ -8505,9 +8435,7 @@
           <p:txBody>
             <a:bodyPr wrap="square" lIns="0" tIns="0" rIns="0" bIns="0" rtlCol="0"/>
             <a:lstStyle/>
-            <a:p>
-              <a:endParaRPr/>
-            </a:p>
+            <a:p/>
           </p:txBody>
         </p:sp>
         <p:pic>
@@ -8517,7 +8445,7 @@
             <p:nvPr/>
           </p:nvPicPr>
           <p:blipFill>
-            <a:blip r:embed="rId8" cstate="print"/>
+            <a:blip r:embed="rId7" cstate="print"/>
             <a:stretch>
               <a:fillRect/>
             </a:stretch>
@@ -8539,7 +8467,7 @@
             <p:nvPr/>
           </p:nvPicPr>
           <p:blipFill>
-            <a:blip r:embed="rId9" cstate="print"/>
+            <a:blip r:embed="rId8" cstate="print"/>
             <a:stretch>
               <a:fillRect/>
             </a:stretch>
@@ -8561,7 +8489,7 @@
             <p:nvPr/>
           </p:nvPicPr>
           <p:blipFill>
-            <a:blip r:embed="rId10" cstate="print"/>
+            <a:blip r:embed="rId9" cstate="print"/>
             <a:stretch>
               <a:fillRect/>
             </a:stretch>
@@ -8671,9 +8599,7 @@
           <p:txBody>
             <a:bodyPr wrap="square" lIns="0" tIns="0" rIns="0" bIns="0" rtlCol="0"/>
             <a:lstStyle/>
-            <a:p>
-              <a:endParaRPr/>
-            </a:p>
+            <a:p/>
           </p:txBody>
         </p:sp>
         <p:pic>
@@ -8683,7 +8609,7 @@
             <p:nvPr/>
           </p:nvPicPr>
           <p:blipFill>
-            <a:blip r:embed="rId11" cstate="print"/>
+            <a:blip r:embed="rId10" cstate="print"/>
             <a:stretch>
               <a:fillRect/>
             </a:stretch>
@@ -8705,7 +8631,7 @@
             <p:nvPr/>
           </p:nvPicPr>
           <p:blipFill>
-            <a:blip r:embed="rId12" cstate="print"/>
+            <a:blip r:embed="rId11" cstate="print"/>
             <a:stretch>
               <a:fillRect/>
             </a:stretch>
@@ -8863,9 +8789,7 @@
           <p:txBody>
             <a:bodyPr wrap="square" lIns="0" tIns="0" rIns="0" bIns="0" rtlCol="0"/>
             <a:lstStyle/>
-            <a:p>
-              <a:endParaRPr/>
-            </a:p>
+            <a:p/>
           </p:txBody>
         </p:sp>
       </p:grpSp>
@@ -8896,8 +8820,8 @@
               </a:lnSpc>
             </a:pPr>
             <a:endParaRPr sz="2000">
-              <a:latin typeface="Times New Roman"/>
-              <a:cs typeface="Times New Roman"/>
+              <a:latin typeface="Times New Roman" panose="02020603050405020304"/>
+              <a:cs typeface="Times New Roman" panose="02020603050405020304"/>
             </a:endParaRPr>
           </a:p>
           <a:p>
@@ -8907,8 +8831,8 @@
               </a:lnSpc>
             </a:pPr>
             <a:endParaRPr sz="2800">
-              <a:latin typeface="Times New Roman"/>
-              <a:cs typeface="Times New Roman"/>
+              <a:latin typeface="Times New Roman" panose="02020603050405020304"/>
+              <a:cs typeface="Times New Roman" panose="02020603050405020304"/>
             </a:endParaRPr>
           </a:p>
           <a:p>
@@ -8966,8 +8890,6 @@
           <a:p>
             <a:fld id="{B6F15528-21DE-4FAA-801E-634DDDAF4B2B}" type="slidenum">
               <a:rPr lang="en-US" smtClean="0"/>
-              <a:pPr/>
-              <a:t>5</a:t>
             </a:fld>
             <a:endParaRPr lang="en-US"/>
           </a:p>
@@ -9043,6 +8965,7 @@
               <a:rPr spc="-5" dirty="0"/>
               <a:t>Prefix</a:t>
             </a:r>
+            <a:endParaRPr spc="-5" dirty="0"/>
           </a:p>
         </p:txBody>
       </p:sp>
@@ -9105,9 +9028,7 @@
           <p:txBody>
             <a:bodyPr wrap="square" lIns="0" tIns="0" rIns="0" bIns="0" rtlCol="0"/>
             <a:lstStyle/>
-            <a:p>
-              <a:endParaRPr/>
-            </a:p>
+            <a:p/>
           </p:txBody>
         </p:sp>
         <p:sp>
@@ -9157,9 +9078,7 @@
           <p:txBody>
             <a:bodyPr wrap="square" lIns="0" tIns="0" rIns="0" bIns="0" rtlCol="0"/>
             <a:lstStyle/>
-            <a:p>
-              <a:endParaRPr/>
-            </a:p>
+            <a:p/>
           </p:txBody>
         </p:sp>
       </p:grpSp>
@@ -9194,35 +9113,35 @@
             </a:pPr>
             <a:r>
               <a:rPr sz="1800" spc="-660" dirty="0">
-                <a:latin typeface="Consolas"/>
-                <a:cs typeface="Consolas"/>
+                <a:latin typeface="Consolas" panose="020B0609020204030204"/>
+                <a:cs typeface="Consolas" panose="020B0609020204030204"/>
               </a:rPr>
               <a:t>-­</a:t>
             </a:r>
             <a:r>
               <a:rPr sz="1800" spc="-665" dirty="0">
-                <a:latin typeface="Consolas"/>
-                <a:cs typeface="Consolas"/>
+                <a:latin typeface="Consolas" panose="020B0609020204030204"/>
+                <a:cs typeface="Consolas" panose="020B0609020204030204"/>
               </a:rPr>
               <a:t>‐</a:t>
             </a:r>
             <a:r>
               <a:rPr sz="1800" dirty="0">
-                <a:latin typeface="Consolas"/>
-                <a:cs typeface="Consolas"/>
+                <a:latin typeface="Consolas" panose="020B0609020204030204"/>
+                <a:cs typeface="Consolas" panose="020B0609020204030204"/>
               </a:rPr>
               <a:t>webkit</a:t>
             </a:r>
             <a:r>
               <a:rPr sz="1800" spc="-285" dirty="0">
-                <a:latin typeface="Consolas"/>
-                <a:cs typeface="Consolas"/>
+                <a:latin typeface="Consolas" panose="020B0609020204030204"/>
+                <a:cs typeface="Consolas" panose="020B0609020204030204"/>
               </a:rPr>
               <a:t>-­‐box;</a:t>
             </a:r>
             <a:endParaRPr sz="1800">
-              <a:latin typeface="Consolas"/>
-              <a:cs typeface="Consolas"/>
+              <a:latin typeface="Consolas" panose="020B0609020204030204"/>
+              <a:cs typeface="Consolas" panose="020B0609020204030204"/>
             </a:endParaRPr>
           </a:p>
           <a:p>
@@ -9231,19 +9150,19 @@
                 <a:spcPct val="100000"/>
               </a:lnSpc>
               <a:spcBef>
-                <a:spcPts val="439"/>
+                <a:spcPts val="440"/>
               </a:spcBef>
             </a:pPr>
             <a:r>
               <a:rPr sz="1800" spc="-305" dirty="0">
-                <a:latin typeface="Consolas"/>
-                <a:cs typeface="Consolas"/>
+                <a:latin typeface="Consolas" panose="020B0609020204030204"/>
+                <a:cs typeface="Consolas" panose="020B0609020204030204"/>
               </a:rPr>
               <a:t>-­‐moz-­‐box;</a:t>
             </a:r>
             <a:endParaRPr sz="1800">
-              <a:latin typeface="Consolas"/>
-              <a:cs typeface="Consolas"/>
+              <a:latin typeface="Consolas" panose="020B0609020204030204"/>
+              <a:cs typeface="Consolas" panose="020B0609020204030204"/>
             </a:endParaRPr>
           </a:p>
           <a:p>
@@ -9252,19 +9171,19 @@
                 <a:spcPct val="100000"/>
               </a:lnSpc>
               <a:spcBef>
-                <a:spcPts val="439"/>
+                <a:spcPts val="440"/>
               </a:spcBef>
             </a:pPr>
             <a:r>
               <a:rPr sz="1800" spc="-335" dirty="0">
-                <a:latin typeface="Consolas"/>
-                <a:cs typeface="Consolas"/>
+                <a:latin typeface="Consolas" panose="020B0609020204030204"/>
+                <a:cs typeface="Consolas" panose="020B0609020204030204"/>
               </a:rPr>
               <a:t>-­‐ms-­‐box;</a:t>
             </a:r>
             <a:endParaRPr sz="1800">
-              <a:latin typeface="Consolas"/>
-              <a:cs typeface="Consolas"/>
+              <a:latin typeface="Consolas" panose="020B0609020204030204"/>
+              <a:cs typeface="Consolas" panose="020B0609020204030204"/>
             </a:endParaRPr>
           </a:p>
           <a:p>
@@ -9273,19 +9192,19 @@
                 <a:spcPct val="100000"/>
               </a:lnSpc>
               <a:spcBef>
-                <a:spcPts val="439"/>
+                <a:spcPts val="440"/>
               </a:spcBef>
             </a:pPr>
             <a:r>
               <a:rPr sz="1800" dirty="0">
-                <a:latin typeface="Consolas"/>
-                <a:cs typeface="Consolas"/>
+                <a:latin typeface="Consolas" panose="020B0609020204030204"/>
+                <a:cs typeface="Consolas" panose="020B0609020204030204"/>
               </a:rPr>
               <a:t>box;</a:t>
             </a:r>
             <a:endParaRPr sz="1800">
-              <a:latin typeface="Consolas"/>
-              <a:cs typeface="Consolas"/>
+              <a:latin typeface="Consolas" panose="020B0609020204030204"/>
+              <a:cs typeface="Consolas" panose="020B0609020204030204"/>
             </a:endParaRPr>
           </a:p>
         </p:txBody>
@@ -9313,7 +9232,7 @@
           <a:p>
             <a:pPr marL="342265" marR="5080" indent="-342900">
               <a:lnSpc>
-                <a:spcPct val="119600"/>
+                <a:spcPct val="120000"/>
               </a:lnSpc>
               <a:spcBef>
                 <a:spcPts val="45"/>
@@ -9321,28 +9240,28 @@
             </a:pPr>
             <a:r>
               <a:rPr sz="1800" dirty="0">
-                <a:latin typeface="Consolas"/>
-                <a:cs typeface="Consolas"/>
+                <a:latin typeface="Consolas" panose="020B0609020204030204"/>
+                <a:cs typeface="Consolas" panose="020B0609020204030204"/>
               </a:rPr>
               <a:t>#content { </a:t>
             </a:r>
             <a:r>
               <a:rPr sz="1800" spc="-975" dirty="0">
-                <a:latin typeface="Consolas"/>
-                <a:cs typeface="Consolas"/>
+                <a:latin typeface="Consolas" panose="020B0609020204030204"/>
+                <a:cs typeface="Consolas" panose="020B0609020204030204"/>
               </a:rPr>
               <a:t> </a:t>
             </a:r>
             <a:r>
               <a:rPr sz="1800" dirty="0">
-                <a:latin typeface="Consolas"/>
-                <a:cs typeface="Consolas"/>
+                <a:latin typeface="Consolas" panose="020B0609020204030204"/>
+                <a:cs typeface="Consolas" panose="020B0609020204030204"/>
               </a:rPr>
               <a:t>display:  display:  display:  display:</a:t>
             </a:r>
             <a:endParaRPr sz="1800">
-              <a:latin typeface="Consolas"/>
-              <a:cs typeface="Consolas"/>
+              <a:latin typeface="Consolas" panose="020B0609020204030204"/>
+              <a:cs typeface="Consolas" panose="020B0609020204030204"/>
             </a:endParaRPr>
           </a:p>
           <a:p>
@@ -9356,14 +9275,14 @@
             </a:pPr>
             <a:r>
               <a:rPr sz="1800" dirty="0">
-                <a:latin typeface="Consolas"/>
-                <a:cs typeface="Consolas"/>
+                <a:latin typeface="Consolas" panose="020B0609020204030204"/>
+                <a:cs typeface="Consolas" panose="020B0609020204030204"/>
               </a:rPr>
               <a:t>}</a:t>
             </a:r>
             <a:endParaRPr sz="1800">
-              <a:latin typeface="Consolas"/>
-              <a:cs typeface="Consolas"/>
+              <a:latin typeface="Consolas" panose="020B0609020204030204"/>
+              <a:cs typeface="Consolas" panose="020B0609020204030204"/>
             </a:endParaRPr>
           </a:p>
         </p:txBody>
@@ -9375,7 +9294,7 @@
           <p:nvPr/>
         </p:nvPicPr>
         <p:blipFill>
-          <a:blip r:embed="rId2" cstate="print"/>
+          <a:blip r:embed="rId1" cstate="print"/>
           <a:stretch>
             <a:fillRect/>
           </a:stretch>
@@ -9407,8 +9326,6 @@
           <a:p>
             <a:fld id="{B6F15528-21DE-4FAA-801E-634DDDAF4B2B}" type="slidenum">
               <a:rPr lang="en-US" smtClean="0"/>
-              <a:pPr/>
-              <a:t>6</a:t>
             </a:fld>
             <a:endParaRPr lang="en-US"/>
           </a:p>
@@ -9476,6 +9393,7 @@
               <a:rPr spc="-5" dirty="0"/>
               <a:t>Columns</a:t>
             </a:r>
+            <a:endParaRPr spc="-5" dirty="0"/>
           </a:p>
         </p:txBody>
       </p:sp>
@@ -9518,84 +9436,84 @@
             </a:pPr>
             <a:r>
               <a:rPr sz="1800" spc="-95" dirty="0">
-                <a:latin typeface="Consolas"/>
-                <a:cs typeface="Consolas"/>
+                <a:latin typeface="Consolas" panose="020B0609020204030204"/>
+                <a:cs typeface="Consolas" panose="020B0609020204030204"/>
               </a:rPr>
               <a:t>article:first-­‐child</a:t>
             </a:r>
             <a:r>
               <a:rPr sz="1800" spc="-30" dirty="0">
-                <a:latin typeface="Consolas"/>
-                <a:cs typeface="Consolas"/>
+                <a:latin typeface="Consolas" panose="020B0609020204030204"/>
+                <a:cs typeface="Consolas" panose="020B0609020204030204"/>
               </a:rPr>
               <a:t> </a:t>
             </a:r>
             <a:r>
               <a:rPr sz="1800" dirty="0">
-                <a:latin typeface="Consolas"/>
-                <a:cs typeface="Consolas"/>
+                <a:latin typeface="Consolas" panose="020B0609020204030204"/>
+                <a:cs typeface="Consolas" panose="020B0609020204030204"/>
               </a:rPr>
               <a:t>&gt;</a:t>
             </a:r>
             <a:r>
               <a:rPr sz="1800" spc="-30" dirty="0">
-                <a:latin typeface="Consolas"/>
-                <a:cs typeface="Consolas"/>
+                <a:latin typeface="Consolas" panose="020B0609020204030204"/>
+                <a:cs typeface="Consolas" panose="020B0609020204030204"/>
               </a:rPr>
               <a:t> </a:t>
             </a:r>
             <a:r>
               <a:rPr sz="1800" dirty="0">
-                <a:latin typeface="Consolas"/>
-                <a:cs typeface="Consolas"/>
+                <a:latin typeface="Consolas" panose="020B0609020204030204"/>
+                <a:cs typeface="Consolas" panose="020B0609020204030204"/>
               </a:rPr>
               <a:t>p</a:t>
             </a:r>
             <a:r>
               <a:rPr sz="1800" spc="-25" dirty="0">
-                <a:latin typeface="Consolas"/>
-                <a:cs typeface="Consolas"/>
+                <a:latin typeface="Consolas" panose="020B0609020204030204"/>
+                <a:cs typeface="Consolas" panose="020B0609020204030204"/>
               </a:rPr>
               <a:t> </a:t>
             </a:r>
             <a:r>
               <a:rPr sz="1800" dirty="0">
-                <a:latin typeface="Consolas"/>
-                <a:cs typeface="Consolas"/>
+                <a:latin typeface="Consolas" panose="020B0609020204030204"/>
+                <a:cs typeface="Consolas" panose="020B0609020204030204"/>
               </a:rPr>
               <a:t>{ </a:t>
             </a:r>
             <a:r>
               <a:rPr sz="1800" spc="-975" dirty="0">
-                <a:latin typeface="Consolas"/>
-                <a:cs typeface="Consolas"/>
+                <a:latin typeface="Consolas" panose="020B0609020204030204"/>
+                <a:cs typeface="Consolas" panose="020B0609020204030204"/>
               </a:rPr>
               <a:t> </a:t>
             </a:r>
             <a:r>
               <a:rPr sz="1800" spc="-135" dirty="0">
-                <a:latin typeface="Consolas"/>
-                <a:cs typeface="Consolas"/>
+                <a:latin typeface="Consolas" panose="020B0609020204030204"/>
+                <a:cs typeface="Consolas" panose="020B0609020204030204"/>
               </a:rPr>
               <a:t>column-­‐count:</a:t>
             </a:r>
             <a:r>
               <a:rPr sz="1800" spc="-10" dirty="0">
-                <a:latin typeface="Consolas"/>
-                <a:cs typeface="Consolas"/>
+                <a:latin typeface="Consolas" panose="020B0609020204030204"/>
+                <a:cs typeface="Consolas" panose="020B0609020204030204"/>
               </a:rPr>
               <a:t> </a:t>
             </a:r>
             <a:r>
               <a:rPr sz="1800" dirty="0">
-                <a:latin typeface="Consolas"/>
-                <a:cs typeface="Consolas"/>
+                <a:latin typeface="Consolas" panose="020B0609020204030204"/>
+                <a:cs typeface="Consolas" panose="020B0609020204030204"/>
               </a:rPr>
               <a:t>3;</a:t>
             </a:r>
             <a:endParaRPr sz="1800">
-              <a:latin typeface="Consolas"/>
-              <a:cs typeface="Consolas"/>
+              <a:latin typeface="Consolas" panose="020B0609020204030204"/>
+              <a:cs typeface="Consolas" panose="020B0609020204030204"/>
             </a:endParaRPr>
           </a:p>
           <a:p>
@@ -9609,102 +9527,102 @@
             </a:pPr>
             <a:r>
               <a:rPr sz="1800" dirty="0">
-                <a:latin typeface="Consolas"/>
-                <a:cs typeface="Consolas"/>
+                <a:latin typeface="Consolas" panose="020B0609020204030204"/>
+                <a:cs typeface="Consolas" panose="020B0609020204030204"/>
               </a:rPr>
               <a:t>}</a:t>
             </a:r>
             <a:endParaRPr sz="1800">
-              <a:latin typeface="Consolas"/>
-              <a:cs typeface="Consolas"/>
+              <a:latin typeface="Consolas" panose="020B0609020204030204"/>
+              <a:cs typeface="Consolas" panose="020B0609020204030204"/>
             </a:endParaRPr>
           </a:p>
           <a:p>
             <a:pPr marL="433705" marR="3056255" indent="-342900">
               <a:lnSpc>
-                <a:spcPct val="120400"/>
+                <a:spcPct val="120000"/>
               </a:lnSpc>
             </a:pPr>
             <a:r>
               <a:rPr sz="1800" spc="-100" dirty="0">
-                <a:latin typeface="Consolas"/>
-                <a:cs typeface="Consolas"/>
+                <a:latin typeface="Consolas" panose="020B0609020204030204"/>
+                <a:cs typeface="Consolas" panose="020B0609020204030204"/>
               </a:rPr>
               <a:t>article:last-­‐child</a:t>
             </a:r>
             <a:r>
               <a:rPr sz="1800" spc="-30" dirty="0">
-                <a:latin typeface="Consolas"/>
-                <a:cs typeface="Consolas"/>
+                <a:latin typeface="Consolas" panose="020B0609020204030204"/>
+                <a:cs typeface="Consolas" panose="020B0609020204030204"/>
               </a:rPr>
               <a:t> </a:t>
             </a:r>
             <a:r>
               <a:rPr sz="1800" dirty="0">
-                <a:latin typeface="Consolas"/>
-                <a:cs typeface="Consolas"/>
+                <a:latin typeface="Consolas" panose="020B0609020204030204"/>
+                <a:cs typeface="Consolas" panose="020B0609020204030204"/>
               </a:rPr>
               <a:t>&gt;</a:t>
             </a:r>
             <a:r>
               <a:rPr sz="1800" spc="-25" dirty="0">
-                <a:latin typeface="Consolas"/>
-                <a:cs typeface="Consolas"/>
+                <a:latin typeface="Consolas" panose="020B0609020204030204"/>
+                <a:cs typeface="Consolas" panose="020B0609020204030204"/>
               </a:rPr>
               <a:t> </a:t>
             </a:r>
             <a:r>
               <a:rPr sz="1800" dirty="0">
-                <a:latin typeface="Consolas"/>
-                <a:cs typeface="Consolas"/>
+                <a:latin typeface="Consolas" panose="020B0609020204030204"/>
+                <a:cs typeface="Consolas" panose="020B0609020204030204"/>
               </a:rPr>
               <a:t>p</a:t>
             </a:r>
             <a:r>
               <a:rPr sz="1800" spc="-25" dirty="0">
-                <a:latin typeface="Consolas"/>
-                <a:cs typeface="Consolas"/>
+                <a:latin typeface="Consolas" panose="020B0609020204030204"/>
+                <a:cs typeface="Consolas" panose="020B0609020204030204"/>
               </a:rPr>
               <a:t> </a:t>
             </a:r>
             <a:r>
               <a:rPr sz="1800" dirty="0">
-                <a:latin typeface="Consolas"/>
-                <a:cs typeface="Consolas"/>
+                <a:latin typeface="Consolas" panose="020B0609020204030204"/>
+                <a:cs typeface="Consolas" panose="020B0609020204030204"/>
               </a:rPr>
               <a:t>{ </a:t>
             </a:r>
             <a:r>
               <a:rPr sz="1800" spc="-975" dirty="0">
-                <a:latin typeface="Consolas"/>
-                <a:cs typeface="Consolas"/>
+                <a:latin typeface="Consolas" panose="020B0609020204030204"/>
+                <a:cs typeface="Consolas" panose="020B0609020204030204"/>
               </a:rPr>
               <a:t> </a:t>
             </a:r>
             <a:r>
               <a:rPr sz="1800" spc="-135" dirty="0">
-                <a:latin typeface="Consolas"/>
-                <a:cs typeface="Consolas"/>
+                <a:latin typeface="Consolas" panose="020B0609020204030204"/>
+                <a:cs typeface="Consolas" panose="020B0609020204030204"/>
               </a:rPr>
               <a:t>column-­‐width:</a:t>
             </a:r>
             <a:r>
               <a:rPr sz="1800" spc="-25" dirty="0">
-                <a:latin typeface="Consolas"/>
-                <a:cs typeface="Consolas"/>
+                <a:latin typeface="Consolas" panose="020B0609020204030204"/>
+                <a:cs typeface="Consolas" panose="020B0609020204030204"/>
               </a:rPr>
               <a:t> </a:t>
             </a:r>
             <a:r>
               <a:rPr sz="1800" dirty="0">
-                <a:latin typeface="Consolas"/>
-                <a:cs typeface="Consolas"/>
+                <a:latin typeface="Consolas" panose="020B0609020204030204"/>
+                <a:cs typeface="Consolas" panose="020B0609020204030204"/>
               </a:rPr>
               <a:t>120px;</a:t>
             </a:r>
             <a:endParaRPr sz="1800">
-              <a:latin typeface="Consolas"/>
-              <a:cs typeface="Consolas"/>
+              <a:latin typeface="Consolas" panose="020B0609020204030204"/>
+              <a:cs typeface="Consolas" panose="020B0609020204030204"/>
             </a:endParaRPr>
           </a:p>
           <a:p>
@@ -9718,14 +9636,14 @@
             </a:pPr>
             <a:r>
               <a:rPr sz="1800" dirty="0">
-                <a:latin typeface="Consolas"/>
-                <a:cs typeface="Consolas"/>
+                <a:latin typeface="Consolas" panose="020B0609020204030204"/>
+                <a:cs typeface="Consolas" panose="020B0609020204030204"/>
               </a:rPr>
               <a:t>}</a:t>
             </a:r>
             <a:endParaRPr sz="1800">
-              <a:latin typeface="Consolas"/>
-              <a:cs typeface="Consolas"/>
+              <a:latin typeface="Consolas" panose="020B0609020204030204"/>
+              <a:cs typeface="Consolas" panose="020B0609020204030204"/>
             </a:endParaRPr>
           </a:p>
           <a:p>
@@ -9738,8 +9656,8 @@
               </a:spcBef>
             </a:pPr>
             <a:endParaRPr sz="2550">
-              <a:latin typeface="Consolas"/>
-              <a:cs typeface="Consolas"/>
+              <a:latin typeface="Consolas" panose="020B0609020204030204"/>
+              <a:cs typeface="Consolas" panose="020B0609020204030204"/>
             </a:endParaRPr>
           </a:p>
           <a:p>
@@ -9750,98 +9668,98 @@
             </a:pPr>
             <a:r>
               <a:rPr sz="1800" dirty="0">
-                <a:latin typeface="Consolas"/>
-                <a:cs typeface="Consolas"/>
+                <a:latin typeface="Consolas" panose="020B0609020204030204"/>
+                <a:cs typeface="Consolas" panose="020B0609020204030204"/>
               </a:rPr>
               <a:t>/*</a:t>
             </a:r>
             <a:r>
               <a:rPr sz="1800" spc="-15" dirty="0">
-                <a:latin typeface="Consolas"/>
-                <a:cs typeface="Consolas"/>
+                <a:latin typeface="Consolas" panose="020B0609020204030204"/>
+                <a:cs typeface="Consolas" panose="020B0609020204030204"/>
               </a:rPr>
               <a:t> </a:t>
             </a:r>
             <a:r>
               <a:rPr sz="1800" dirty="0">
-                <a:latin typeface="Consolas"/>
-                <a:cs typeface="Consolas"/>
+                <a:latin typeface="Consolas" panose="020B0609020204030204"/>
+                <a:cs typeface="Consolas" panose="020B0609020204030204"/>
               </a:rPr>
               <a:t>use</a:t>
             </a:r>
             <a:r>
               <a:rPr sz="1800" spc="-20" dirty="0">
-                <a:latin typeface="Consolas"/>
-                <a:cs typeface="Consolas"/>
+                <a:latin typeface="Consolas" panose="020B0609020204030204"/>
+                <a:cs typeface="Consolas" panose="020B0609020204030204"/>
               </a:rPr>
               <a:t> </a:t>
             </a:r>
             <a:r>
               <a:rPr sz="1800" spc="-165" dirty="0">
-                <a:latin typeface="Consolas"/>
-                <a:cs typeface="Consolas"/>
+                <a:latin typeface="Consolas" panose="020B0609020204030204"/>
+                <a:cs typeface="Consolas" panose="020B0609020204030204"/>
               </a:rPr>
               <a:t>column-­‐gap</a:t>
             </a:r>
             <a:r>
               <a:rPr sz="1800" spc="-15" dirty="0">
-                <a:latin typeface="Consolas"/>
-                <a:cs typeface="Consolas"/>
+                <a:latin typeface="Consolas" panose="020B0609020204030204"/>
+                <a:cs typeface="Consolas" panose="020B0609020204030204"/>
               </a:rPr>
               <a:t> </a:t>
             </a:r>
             <a:r>
               <a:rPr sz="1800" dirty="0">
-                <a:latin typeface="Consolas"/>
-                <a:cs typeface="Consolas"/>
+                <a:latin typeface="Consolas" panose="020B0609020204030204"/>
+                <a:cs typeface="Consolas" panose="020B0609020204030204"/>
               </a:rPr>
               <a:t>to</a:t>
             </a:r>
             <a:r>
               <a:rPr sz="1800" spc="-15" dirty="0">
-                <a:latin typeface="Consolas"/>
-                <a:cs typeface="Consolas"/>
+                <a:latin typeface="Consolas" panose="020B0609020204030204"/>
+                <a:cs typeface="Consolas" panose="020B0609020204030204"/>
               </a:rPr>
               <a:t> </a:t>
             </a:r>
             <a:r>
               <a:rPr sz="1800" dirty="0">
-                <a:latin typeface="Consolas"/>
-                <a:cs typeface="Consolas"/>
+                <a:latin typeface="Consolas" panose="020B0609020204030204"/>
+                <a:cs typeface="Consolas" panose="020B0609020204030204"/>
               </a:rPr>
               <a:t>control</a:t>
             </a:r>
             <a:r>
               <a:rPr sz="1800" spc="-15" dirty="0">
-                <a:latin typeface="Consolas"/>
-                <a:cs typeface="Consolas"/>
+                <a:latin typeface="Consolas" panose="020B0609020204030204"/>
+                <a:cs typeface="Consolas" panose="020B0609020204030204"/>
               </a:rPr>
               <a:t> </a:t>
             </a:r>
             <a:r>
               <a:rPr sz="1800" dirty="0">
-                <a:latin typeface="Consolas"/>
-                <a:cs typeface="Consolas"/>
+                <a:latin typeface="Consolas" panose="020B0609020204030204"/>
+                <a:cs typeface="Consolas" panose="020B0609020204030204"/>
               </a:rPr>
               <a:t>spacing</a:t>
             </a:r>
             <a:r>
               <a:rPr sz="1800" spc="-15" dirty="0">
-                <a:latin typeface="Consolas"/>
-                <a:cs typeface="Consolas"/>
+                <a:latin typeface="Consolas" panose="020B0609020204030204"/>
+                <a:cs typeface="Consolas" panose="020B0609020204030204"/>
               </a:rPr>
               <a:t> </a:t>
             </a:r>
             <a:r>
               <a:rPr sz="1800" dirty="0">
-                <a:latin typeface="Consolas"/>
-                <a:cs typeface="Consolas"/>
+                <a:latin typeface="Consolas" panose="020B0609020204030204"/>
+                <a:cs typeface="Consolas" panose="020B0609020204030204"/>
               </a:rPr>
               <a:t>*/</a:t>
             </a:r>
             <a:endParaRPr sz="1800">
-              <a:latin typeface="Consolas"/>
-              <a:cs typeface="Consolas"/>
+              <a:latin typeface="Consolas" panose="020B0609020204030204"/>
+              <a:cs typeface="Consolas" panose="020B0609020204030204"/>
             </a:endParaRPr>
           </a:p>
         </p:txBody>
@@ -9863,8 +9781,6 @@
           <a:p>
             <a:fld id="{B6F15528-21DE-4FAA-801E-634DDDAF4B2B}" type="slidenum">
               <a:rPr lang="en-US" smtClean="0"/>
-              <a:pPr/>
-              <a:t>7</a:t>
             </a:fld>
             <a:endParaRPr lang="en-US"/>
           </a:p>
@@ -9952,6 +9868,7 @@
               <a:rPr spc="-5" dirty="0"/>
               <a:t>Site</a:t>
             </a:r>
+            <a:endParaRPr spc="-5" dirty="0"/>
           </a:p>
         </p:txBody>
       </p:sp>
@@ -10108,9 +10025,7 @@
         <p:txBody>
           <a:bodyPr wrap="square" lIns="0" tIns="0" rIns="0" bIns="0" rtlCol="0"/>
           <a:lstStyle/>
-          <a:p>
-            <a:endParaRPr/>
-          </a:p>
+          <a:p/>
         </p:txBody>
       </p:sp>
       <p:sp>
@@ -10147,14 +10062,14 @@
                 <a:solidFill>
                   <a:srgbClr val="FFFFFF"/>
                 </a:solidFill>
-                <a:latin typeface="Arial"/>
-                <a:cs typeface="Arial"/>
+                <a:latin typeface="Arial" panose="020B0604020202020204"/>
+                <a:cs typeface="Arial" panose="020B0604020202020204"/>
               </a:rPr>
               <a:t>DEMO</a:t>
             </a:r>
             <a:endParaRPr sz="6500">
-              <a:latin typeface="Arial"/>
-              <a:cs typeface="Arial"/>
+              <a:latin typeface="Arial" panose="020B0604020202020204"/>
+              <a:cs typeface="Arial" panose="020B0604020202020204"/>
             </a:endParaRPr>
           </a:p>
         </p:txBody>
@@ -10176,8 +10091,6 @@
           <a:p>
             <a:fld id="{B6F15528-21DE-4FAA-801E-634DDDAF4B2B}" type="slidenum">
               <a:rPr lang="en-US" smtClean="0"/>
-              <a:pPr/>
-              <a:t>8</a:t>
             </a:fld>
             <a:endParaRPr lang="en-US"/>
           </a:p>
@@ -10239,28 +10152,28 @@
             </a:pPr>
             <a:r>
               <a:rPr sz="2000" b="1" dirty="0">
-                <a:latin typeface="Arial"/>
-                <a:cs typeface="Arial"/>
+                <a:latin typeface="Arial" panose="020B0604020202020204"/>
+                <a:cs typeface="Arial" panose="020B0604020202020204"/>
               </a:rPr>
               <a:t>New</a:t>
             </a:r>
             <a:r>
               <a:rPr sz="2000" b="1" spc="-10" dirty="0">
-                <a:latin typeface="Arial"/>
-                <a:cs typeface="Arial"/>
+                <a:latin typeface="Arial" panose="020B0604020202020204"/>
+                <a:cs typeface="Arial" panose="020B0604020202020204"/>
               </a:rPr>
               <a:t> </a:t>
             </a:r>
             <a:r>
               <a:rPr sz="2000" b="1" spc="-5" dirty="0">
-                <a:latin typeface="Arial"/>
-                <a:cs typeface="Arial"/>
+                <a:latin typeface="Arial" panose="020B0604020202020204"/>
+                <a:cs typeface="Arial" panose="020B0604020202020204"/>
               </a:rPr>
               <a:t>options for things behind the scenes</a:t>
             </a:r>
             <a:endParaRPr sz="2000">
-              <a:latin typeface="Arial"/>
-              <a:cs typeface="Arial"/>
+              <a:latin typeface="Arial" panose="020B0604020202020204"/>
+              <a:cs typeface="Arial" panose="020B0604020202020204"/>
             </a:endParaRPr>
           </a:p>
           <a:p>
@@ -10273,8 +10186,8 @@
               </a:spcBef>
             </a:pPr>
             <a:endParaRPr sz="2050">
-              <a:latin typeface="Arial"/>
-              <a:cs typeface="Arial"/>
+              <a:latin typeface="Arial" panose="020B0604020202020204"/>
+              <a:cs typeface="Arial" panose="020B0604020202020204"/>
             </a:endParaRPr>
           </a:p>
           <a:p>
@@ -10285,14 +10198,14 @@
             </a:pPr>
             <a:r>
               <a:rPr sz="2800" b="1" spc="-5" dirty="0">
-                <a:latin typeface="Arial"/>
-                <a:cs typeface="Arial"/>
+                <a:latin typeface="Arial" panose="020B0604020202020204"/>
+                <a:cs typeface="Arial" panose="020B0604020202020204"/>
               </a:rPr>
               <a:t>Background</a:t>
             </a:r>
             <a:endParaRPr sz="2800">
-              <a:latin typeface="Arial"/>
-              <a:cs typeface="Arial"/>
+              <a:latin typeface="Arial" panose="020B0604020202020204"/>
+              <a:cs typeface="Arial" panose="020B0604020202020204"/>
             </a:endParaRPr>
           </a:p>
         </p:txBody>
@@ -10314,8 +10227,6 @@
           <a:p>
             <a:fld id="{B6F15528-21DE-4FAA-801E-634DDDAF4B2B}" type="slidenum">
               <a:rPr lang="en-US" smtClean="0"/>
-              <a:pPr/>
-              <a:t>9</a:t>
             </a:fld>
             <a:endParaRPr lang="en-US"/>
           </a:p>
@@ -10607,8 +10518,11 @@
       </a:bgFillStyleLst>
     </a:fmtScheme>
   </a:themeElements>
-  <a:objectDefaults/>
-  <a:extraClrSchemeLst/>
+  <a:extLst>
+    <a:ext uri="{05A4C25C-085E-4340-85A3-A5531E510DB2}">
+      <thm15:themeFamily xmlns:thm15="http://schemas.microsoft.com/office/thememl/2012/main" name="Office Theme" id="{62F939B6-93AF-4DB8-9C6B-D6C7DFDC589F}" vid="{4A3C46E8-61CC-4603-A589-7422A47A8E4A}"/>
+    </a:ext>
+  </a:extLst>
 </a:theme>
 </file>
 
@@ -10890,7 +10804,10 @@
       </a:bgFillStyleLst>
     </a:fmtScheme>
   </a:themeElements>
-  <a:objectDefaults/>
-  <a:extraClrSchemeLst/>
+  <a:extLst>
+    <a:ext uri="{05A4C25C-085E-4340-85A3-A5531E510DB2}">
+      <thm15:themeFamily xmlns:thm15="http://schemas.microsoft.com/office/thememl/2012/main" name="Office Theme" id="{62F939B6-93AF-4DB8-9C6B-D6C7DFDC589F}" vid="{4A3C46E8-61CC-4603-A589-7422A47A8E4A}"/>
+    </a:ext>
+  </a:extLst>
 </a:theme>
 </file>
</xml_diff>